<commit_message>
Update 20230509 데이터베이스 2강 과제.pptx
</commit_message>
<xml_diff>
--- a/데이터베이스프로그래밍 과제/20230509 데이터베이스 2강 과제.pptx
+++ b/데이터베이스프로그래밍 과제/20230509 데이터베이스 2강 과제.pptx
@@ -23,7 +23,25 @@
     <p:sldId id="271" r:id="rId17"/>
     <p:sldId id="272" r:id="rId18"/>
     <p:sldId id="273" r:id="rId19"/>
-    <p:sldId id="274" r:id="rId20"/>
+    <p:sldId id="275" r:id="rId20"/>
+    <p:sldId id="274" r:id="rId21"/>
+    <p:sldId id="276" r:id="rId22"/>
+    <p:sldId id="277" r:id="rId23"/>
+    <p:sldId id="278" r:id="rId24"/>
+    <p:sldId id="279" r:id="rId25"/>
+    <p:sldId id="280" r:id="rId26"/>
+    <p:sldId id="281" r:id="rId27"/>
+    <p:sldId id="282" r:id="rId28"/>
+    <p:sldId id="283" r:id="rId29"/>
+    <p:sldId id="284" r:id="rId30"/>
+    <p:sldId id="285" r:id="rId31"/>
+    <p:sldId id="286" r:id="rId32"/>
+    <p:sldId id="287" r:id="rId33"/>
+    <p:sldId id="288" r:id="rId34"/>
+    <p:sldId id="289" r:id="rId35"/>
+    <p:sldId id="290" r:id="rId36"/>
+    <p:sldId id="291" r:id="rId37"/>
+    <p:sldId id="292" r:id="rId38"/>
   </p:sldIdLst>
   <p:sldSz cx="12192000" cy="6858000"/>
   <p:notesSz cx="6858000" cy="9144000"/>
@@ -3910,11 +3928,54 @@
           <a:p>
             <a:r>
               <a:rPr lang="ko-KR" altLang="en-US" sz="2000" dirty="0"/>
-              <a:t>슬라이드 페이지 실습</a:t>
-            </a:r>
-          </a:p>
-        </p:txBody>
-      </p:sp>
+              <a:t>슬라이드 </a:t>
+            </a:r>
+            <a:r>
+              <a:rPr lang="en-US" altLang="ko-KR" sz="2000" dirty="0"/>
+              <a:t>23</a:t>
+            </a:r>
+            <a:r>
+              <a:rPr lang="ko-KR" altLang="en-US" sz="2000" dirty="0"/>
+              <a:t>페이지 실습 </a:t>
+            </a:r>
+            <a:r>
+              <a:rPr lang="en-US" altLang="ko-KR" sz="2000" dirty="0"/>
+              <a:t>(3), (4)</a:t>
+            </a:r>
+            <a:endParaRPr lang="ko-KR" altLang="en-US" sz="2000" dirty="0"/>
+          </a:p>
+        </p:txBody>
+      </p:sp>
+      <p:pic>
+        <p:nvPicPr>
+          <p:cNvPr id="6" name="그림 5">
+            <a:extLst>
+              <a:ext uri="{FF2B5EF4-FFF2-40B4-BE49-F238E27FC236}">
+                <a16:creationId xmlns:a16="http://schemas.microsoft.com/office/drawing/2014/main" id="{2E38A574-11DC-31EE-2D90-1B01FED8D892}"/>
+              </a:ext>
+            </a:extLst>
+          </p:cNvPr>
+          <p:cNvPicPr>
+            <a:picLocks noChangeAspect="1"/>
+          </p:cNvPicPr>
+          <p:nvPr/>
+        </p:nvPicPr>
+        <p:blipFill>
+          <a:blip r:embed="rId2"/>
+          <a:stretch>
+            <a:fillRect/>
+          </a:stretch>
+        </p:blipFill>
+        <p:spPr>
+          <a:xfrm>
+            <a:off x="1988609" y="476794"/>
+            <a:ext cx="8214781" cy="6381206"/>
+          </a:xfrm>
+          <a:prstGeom prst="rect">
+            <a:avLst/>
+          </a:prstGeom>
+        </p:spPr>
+      </p:pic>
     </p:spTree>
     <p:extLst>
       <p:ext uri="{BB962C8B-B14F-4D97-AF65-F5344CB8AC3E}">
@@ -3975,11 +4036,194 @@
           <a:p>
             <a:r>
               <a:rPr lang="ko-KR" altLang="en-US" sz="2000" dirty="0"/>
-              <a:t>슬라이드 페이지 실습</a:t>
-            </a:r>
-          </a:p>
-        </p:txBody>
-      </p:sp>
+              <a:t>슬라이드 </a:t>
+            </a:r>
+            <a:r>
+              <a:rPr lang="en-US" altLang="ko-KR" sz="2000" dirty="0"/>
+              <a:t>23</a:t>
+            </a:r>
+            <a:r>
+              <a:rPr lang="ko-KR" altLang="en-US" sz="2000" dirty="0"/>
+              <a:t>페이지 실습 </a:t>
+            </a:r>
+            <a:r>
+              <a:rPr lang="en-US" altLang="ko-KR" sz="2000" dirty="0"/>
+              <a:t>(3), (4)</a:t>
+            </a:r>
+            <a:endParaRPr lang="ko-KR" altLang="en-US" sz="2000" dirty="0"/>
+          </a:p>
+        </p:txBody>
+      </p:sp>
+      <p:pic>
+        <p:nvPicPr>
+          <p:cNvPr id="6" name="그림 5">
+            <a:extLst>
+              <a:ext uri="{FF2B5EF4-FFF2-40B4-BE49-F238E27FC236}">
+                <a16:creationId xmlns:a16="http://schemas.microsoft.com/office/drawing/2014/main" id="{1C8F1B25-ABAE-1916-73EF-FFE37081595A}"/>
+              </a:ext>
+            </a:extLst>
+          </p:cNvPr>
+          <p:cNvPicPr>
+            <a:picLocks noChangeAspect="1"/>
+          </p:cNvPicPr>
+          <p:nvPr/>
+        </p:nvPicPr>
+        <p:blipFill>
+          <a:blip r:embed="rId2"/>
+          <a:stretch>
+            <a:fillRect/>
+          </a:stretch>
+        </p:blipFill>
+        <p:spPr>
+          <a:xfrm>
+            <a:off x="2949030" y="3592643"/>
+            <a:ext cx="2629267" cy="342948"/>
+          </a:xfrm>
+          <a:prstGeom prst="rect">
+            <a:avLst/>
+          </a:prstGeom>
+        </p:spPr>
+      </p:pic>
+      <p:pic>
+        <p:nvPicPr>
+          <p:cNvPr id="8" name="그림 7">
+            <a:extLst>
+              <a:ext uri="{FF2B5EF4-FFF2-40B4-BE49-F238E27FC236}">
+                <a16:creationId xmlns:a16="http://schemas.microsoft.com/office/drawing/2014/main" id="{A05D9C9B-461E-6B47-710A-A71B0712945D}"/>
+              </a:ext>
+            </a:extLst>
+          </p:cNvPr>
+          <p:cNvPicPr>
+            <a:picLocks noChangeAspect="1"/>
+          </p:cNvPicPr>
+          <p:nvPr/>
+        </p:nvPicPr>
+        <p:blipFill>
+          <a:blip r:embed="rId3"/>
+          <a:stretch>
+            <a:fillRect/>
+          </a:stretch>
+        </p:blipFill>
+        <p:spPr>
+          <a:xfrm>
+            <a:off x="8106532" y="3326981"/>
+            <a:ext cx="1398836" cy="874272"/>
+          </a:xfrm>
+          <a:prstGeom prst="rect">
+            <a:avLst/>
+          </a:prstGeom>
+        </p:spPr>
+      </p:pic>
+      <p:sp>
+        <p:nvSpPr>
+          <p:cNvPr id="9" name="TextBox 8">
+            <a:extLst>
+              <a:ext uri="{FF2B5EF4-FFF2-40B4-BE49-F238E27FC236}">
+                <a16:creationId xmlns:a16="http://schemas.microsoft.com/office/drawing/2014/main" id="{FD4F643F-4D55-08EC-885B-6912AC98E4D1}"/>
+              </a:ext>
+            </a:extLst>
+          </p:cNvPr>
+          <p:cNvSpPr txBox="1"/>
+          <p:nvPr/>
+        </p:nvSpPr>
+        <p:spPr>
+          <a:xfrm>
+            <a:off x="3482649" y="4629688"/>
+            <a:ext cx="6293940" cy="646331"/>
+          </a:xfrm>
+          <a:prstGeom prst="rect">
+            <a:avLst/>
+          </a:prstGeom>
+          <a:noFill/>
+        </p:spPr>
+        <p:txBody>
+          <a:bodyPr wrap="square" rtlCol="0">
+            <a:spAutoFit/>
+          </a:bodyPr>
+          <a:lstStyle/>
+          <a:p>
+            <a:r>
+              <a:rPr lang="ko-KR" altLang="en-US" dirty="0"/>
+              <a:t>크기가 </a:t>
+            </a:r>
+            <a:r>
+              <a:rPr lang="en-US" altLang="ko-KR" dirty="0"/>
+              <a:t>1 </a:t>
+            </a:r>
+            <a:r>
+              <a:rPr lang="ko-KR" altLang="en-US" dirty="0"/>
+              <a:t>차이나는 이유는 </a:t>
+            </a:r>
+            <a:r>
+              <a:rPr lang="en-US" altLang="ko-KR" dirty="0" err="1"/>
+              <a:t>eclips</a:t>
+            </a:r>
+            <a:r>
+              <a:rPr lang="ko-KR" altLang="en-US" dirty="0"/>
+              <a:t>안에서 데이터가 </a:t>
+            </a:r>
+            <a:r>
+              <a:rPr lang="ko-KR" altLang="en-US" dirty="0" err="1"/>
+              <a:t>들어갈때</a:t>
+            </a:r>
+            <a:r>
+              <a:rPr lang="ko-KR" altLang="en-US" dirty="0"/>
+              <a:t> </a:t>
+            </a:r>
+            <a:r>
+              <a:rPr lang="en-US" altLang="ko-KR" dirty="0"/>
+              <a:t>0</a:t>
+            </a:r>
+            <a:r>
+              <a:rPr lang="ko-KR" altLang="en-US" dirty="0"/>
+              <a:t>번째 항목부터 들어가게끔 </a:t>
+            </a:r>
+            <a:r>
+              <a:rPr lang="ko-KR" altLang="en-US" dirty="0" err="1"/>
+              <a:t>설정되어있기</a:t>
+            </a:r>
+            <a:r>
+              <a:rPr lang="ko-KR" altLang="en-US" dirty="0"/>
+              <a:t> 때문임</a:t>
+            </a:r>
+            <a:r>
+              <a:rPr lang="en-US" altLang="ko-KR" dirty="0"/>
+              <a:t>.</a:t>
+            </a:r>
+            <a:endParaRPr lang="ko-KR" altLang="en-US" dirty="0"/>
+          </a:p>
+        </p:txBody>
+      </p:sp>
+      <p:pic>
+        <p:nvPicPr>
+          <p:cNvPr id="11" name="그림 10">
+            <a:extLst>
+              <a:ext uri="{FF2B5EF4-FFF2-40B4-BE49-F238E27FC236}">
+                <a16:creationId xmlns:a16="http://schemas.microsoft.com/office/drawing/2014/main" id="{5EE3EA63-F852-F321-E207-D1A2D50CD036}"/>
+              </a:ext>
+            </a:extLst>
+          </p:cNvPr>
+          <p:cNvPicPr>
+            <a:picLocks noChangeAspect="1"/>
+          </p:cNvPicPr>
+          <p:nvPr/>
+        </p:nvPicPr>
+        <p:blipFill>
+          <a:blip r:embed="rId4"/>
+          <a:stretch>
+            <a:fillRect/>
+          </a:stretch>
+        </p:blipFill>
+        <p:spPr>
+          <a:xfrm>
+            <a:off x="5505994" y="1170891"/>
+            <a:ext cx="2247250" cy="1727655"/>
+          </a:xfrm>
+          <a:prstGeom prst="rect">
+            <a:avLst/>
+          </a:prstGeom>
+        </p:spPr>
+      </p:pic>
     </p:spTree>
     <p:extLst>
       <p:ext uri="{BB962C8B-B14F-4D97-AF65-F5344CB8AC3E}">
@@ -4040,11 +4284,84 @@
           <a:p>
             <a:r>
               <a:rPr lang="ko-KR" altLang="en-US" sz="2000" dirty="0"/>
-              <a:t>슬라이드 페이지 실습</a:t>
-            </a:r>
-          </a:p>
-        </p:txBody>
-      </p:sp>
+              <a:t>슬라이드 </a:t>
+            </a:r>
+            <a:r>
+              <a:rPr lang="en-US" altLang="ko-KR" sz="2000" dirty="0"/>
+              <a:t>24</a:t>
+            </a:r>
+            <a:r>
+              <a:rPr lang="ko-KR" altLang="en-US" sz="2000" dirty="0"/>
+              <a:t>페이지 실습</a:t>
+            </a:r>
+            <a:r>
+              <a:rPr lang="en-US" altLang="ko-KR" sz="2000" dirty="0"/>
+              <a:t>(1)</a:t>
+            </a:r>
+            <a:endParaRPr lang="ko-KR" altLang="en-US" sz="2000" dirty="0"/>
+          </a:p>
+        </p:txBody>
+      </p:sp>
+      <p:pic>
+        <p:nvPicPr>
+          <p:cNvPr id="6" name="그림 5">
+            <a:extLst>
+              <a:ext uri="{FF2B5EF4-FFF2-40B4-BE49-F238E27FC236}">
+                <a16:creationId xmlns:a16="http://schemas.microsoft.com/office/drawing/2014/main" id="{E63CC404-A11E-E7BD-E322-2D4EC02A1D5D}"/>
+              </a:ext>
+            </a:extLst>
+          </p:cNvPr>
+          <p:cNvPicPr>
+            <a:picLocks noChangeAspect="1"/>
+          </p:cNvPicPr>
+          <p:nvPr/>
+        </p:nvPicPr>
+        <p:blipFill>
+          <a:blip r:embed="rId2"/>
+          <a:stretch>
+            <a:fillRect/>
+          </a:stretch>
+        </p:blipFill>
+        <p:spPr>
+          <a:xfrm>
+            <a:off x="8091398" y="2322081"/>
+            <a:ext cx="3219899" cy="2772162"/>
+          </a:xfrm>
+          <a:prstGeom prst="rect">
+            <a:avLst/>
+          </a:prstGeom>
+        </p:spPr>
+      </p:pic>
+      <p:pic>
+        <p:nvPicPr>
+          <p:cNvPr id="8" name="그림 7">
+            <a:extLst>
+              <a:ext uri="{FF2B5EF4-FFF2-40B4-BE49-F238E27FC236}">
+                <a16:creationId xmlns:a16="http://schemas.microsoft.com/office/drawing/2014/main" id="{24845E0F-D4CA-FA35-E611-26B0BC0DC0E6}"/>
+              </a:ext>
+            </a:extLst>
+          </p:cNvPr>
+          <p:cNvPicPr>
+            <a:picLocks noChangeAspect="1"/>
+          </p:cNvPicPr>
+          <p:nvPr/>
+        </p:nvPicPr>
+        <p:blipFill>
+          <a:blip r:embed="rId3"/>
+          <a:stretch>
+            <a:fillRect/>
+          </a:stretch>
+        </p:blipFill>
+        <p:spPr>
+          <a:xfrm>
+            <a:off x="0" y="653493"/>
+            <a:ext cx="6629763" cy="6109338"/>
+          </a:xfrm>
+          <a:prstGeom prst="rect">
+            <a:avLst/>
+          </a:prstGeom>
+        </p:spPr>
+      </p:pic>
     </p:spTree>
     <p:extLst>
       <p:ext uri="{BB962C8B-B14F-4D97-AF65-F5344CB8AC3E}">
@@ -4105,11 +4422,84 @@
           <a:p>
             <a:r>
               <a:rPr lang="ko-KR" altLang="en-US" sz="2000" dirty="0"/>
-              <a:t>슬라이드 페이지 실습</a:t>
-            </a:r>
-          </a:p>
-        </p:txBody>
-      </p:sp>
+              <a:t>슬라이드 </a:t>
+            </a:r>
+            <a:r>
+              <a:rPr lang="en-US" altLang="ko-KR" sz="2000" dirty="0"/>
+              <a:t>24</a:t>
+            </a:r>
+            <a:r>
+              <a:rPr lang="ko-KR" altLang="en-US" sz="2000" dirty="0"/>
+              <a:t>페이지 실습</a:t>
+            </a:r>
+            <a:r>
+              <a:rPr lang="en-US" altLang="ko-KR" sz="2000" dirty="0"/>
+              <a:t>(2)</a:t>
+            </a:r>
+            <a:endParaRPr lang="ko-KR" altLang="en-US" sz="2000" dirty="0"/>
+          </a:p>
+        </p:txBody>
+      </p:sp>
+      <p:pic>
+        <p:nvPicPr>
+          <p:cNvPr id="6" name="그림 5">
+            <a:extLst>
+              <a:ext uri="{FF2B5EF4-FFF2-40B4-BE49-F238E27FC236}">
+                <a16:creationId xmlns:a16="http://schemas.microsoft.com/office/drawing/2014/main" id="{D96F4E5C-BE06-5B04-531E-C56E809987BB}"/>
+              </a:ext>
+            </a:extLst>
+          </p:cNvPr>
+          <p:cNvPicPr>
+            <a:picLocks noChangeAspect="1"/>
+          </p:cNvPicPr>
+          <p:nvPr/>
+        </p:nvPicPr>
+        <p:blipFill>
+          <a:blip r:embed="rId2"/>
+          <a:stretch>
+            <a:fillRect/>
+          </a:stretch>
+        </p:blipFill>
+        <p:spPr>
+          <a:xfrm>
+            <a:off x="8563818" y="0"/>
+            <a:ext cx="2327313" cy="6858000"/>
+          </a:xfrm>
+          <a:prstGeom prst="rect">
+            <a:avLst/>
+          </a:prstGeom>
+        </p:spPr>
+      </p:pic>
+      <p:pic>
+        <p:nvPicPr>
+          <p:cNvPr id="8" name="그림 7">
+            <a:extLst>
+              <a:ext uri="{FF2B5EF4-FFF2-40B4-BE49-F238E27FC236}">
+                <a16:creationId xmlns:a16="http://schemas.microsoft.com/office/drawing/2014/main" id="{79A5A62E-7EE2-F16D-DBC1-4B3F68D259CC}"/>
+              </a:ext>
+            </a:extLst>
+          </p:cNvPr>
+          <p:cNvPicPr>
+            <a:picLocks noChangeAspect="1"/>
+          </p:cNvPicPr>
+          <p:nvPr/>
+        </p:nvPicPr>
+        <p:blipFill>
+          <a:blip r:embed="rId3"/>
+          <a:stretch>
+            <a:fillRect/>
+          </a:stretch>
+        </p:blipFill>
+        <p:spPr>
+          <a:xfrm>
+            <a:off x="0" y="455379"/>
+            <a:ext cx="6957304" cy="6402621"/>
+          </a:xfrm>
+          <a:prstGeom prst="rect">
+            <a:avLst/>
+          </a:prstGeom>
+        </p:spPr>
+      </p:pic>
     </p:spTree>
     <p:extLst>
       <p:ext uri="{BB962C8B-B14F-4D97-AF65-F5344CB8AC3E}">
@@ -4170,11 +4560,84 @@
           <a:p>
             <a:r>
               <a:rPr lang="ko-KR" altLang="en-US" sz="2000" dirty="0"/>
-              <a:t>슬라이드 페이지 실습</a:t>
-            </a:r>
-          </a:p>
-        </p:txBody>
-      </p:sp>
+              <a:t>슬라이드 </a:t>
+            </a:r>
+            <a:r>
+              <a:rPr lang="en-US" altLang="ko-KR" sz="2000" dirty="0"/>
+              <a:t>24</a:t>
+            </a:r>
+            <a:r>
+              <a:rPr lang="ko-KR" altLang="en-US" sz="2000" dirty="0"/>
+              <a:t>페이지 실습</a:t>
+            </a:r>
+            <a:r>
+              <a:rPr lang="en-US" altLang="ko-KR" sz="2000" dirty="0"/>
+              <a:t>(3)</a:t>
+            </a:r>
+            <a:endParaRPr lang="ko-KR" altLang="en-US" sz="2000" dirty="0"/>
+          </a:p>
+        </p:txBody>
+      </p:sp>
+      <p:pic>
+        <p:nvPicPr>
+          <p:cNvPr id="6" name="그림 5">
+            <a:extLst>
+              <a:ext uri="{FF2B5EF4-FFF2-40B4-BE49-F238E27FC236}">
+                <a16:creationId xmlns:a16="http://schemas.microsoft.com/office/drawing/2014/main" id="{FD1011A2-352B-7CE2-9520-1733A6581D6A}"/>
+              </a:ext>
+            </a:extLst>
+          </p:cNvPr>
+          <p:cNvPicPr>
+            <a:picLocks noChangeAspect="1"/>
+          </p:cNvPicPr>
+          <p:nvPr/>
+        </p:nvPicPr>
+        <p:blipFill>
+          <a:blip r:embed="rId2"/>
+          <a:stretch>
+            <a:fillRect/>
+          </a:stretch>
+        </p:blipFill>
+        <p:spPr>
+          <a:xfrm>
+            <a:off x="8660674" y="0"/>
+            <a:ext cx="2351314" cy="6858000"/>
+          </a:xfrm>
+          <a:prstGeom prst="rect">
+            <a:avLst/>
+          </a:prstGeom>
+        </p:spPr>
+      </p:pic>
+      <p:pic>
+        <p:nvPicPr>
+          <p:cNvPr id="8" name="그림 7">
+            <a:extLst>
+              <a:ext uri="{FF2B5EF4-FFF2-40B4-BE49-F238E27FC236}">
+                <a16:creationId xmlns:a16="http://schemas.microsoft.com/office/drawing/2014/main" id="{192B9FC6-C3E6-8FD4-0E7A-3CEAF53F20F4}"/>
+              </a:ext>
+            </a:extLst>
+          </p:cNvPr>
+          <p:cNvPicPr>
+            <a:picLocks noChangeAspect="1"/>
+          </p:cNvPicPr>
+          <p:nvPr/>
+        </p:nvPicPr>
+        <p:blipFill>
+          <a:blip r:embed="rId3"/>
+          <a:stretch>
+            <a:fillRect/>
+          </a:stretch>
+        </p:blipFill>
+        <p:spPr>
+          <a:xfrm>
+            <a:off x="0" y="476794"/>
+            <a:ext cx="6950533" cy="6381206"/>
+          </a:xfrm>
+          <a:prstGeom prst="rect">
+            <a:avLst/>
+          </a:prstGeom>
+        </p:spPr>
+      </p:pic>
     </p:spTree>
     <p:extLst>
       <p:ext uri="{BB962C8B-B14F-4D97-AF65-F5344CB8AC3E}">
@@ -4235,11 +4698,84 @@
           <a:p>
             <a:r>
               <a:rPr lang="ko-KR" altLang="en-US" sz="2000" dirty="0"/>
-              <a:t>슬라이드 페이지 실습</a:t>
-            </a:r>
-          </a:p>
-        </p:txBody>
-      </p:sp>
+              <a:t>슬라이드 </a:t>
+            </a:r>
+            <a:r>
+              <a:rPr lang="en-US" altLang="ko-KR" sz="2000" dirty="0"/>
+              <a:t>24</a:t>
+            </a:r>
+            <a:r>
+              <a:rPr lang="ko-KR" altLang="en-US" sz="2000" dirty="0"/>
+              <a:t>페이지 실습</a:t>
+            </a:r>
+            <a:r>
+              <a:rPr lang="en-US" altLang="ko-KR" sz="2000" dirty="0"/>
+              <a:t>(4)</a:t>
+            </a:r>
+            <a:endParaRPr lang="ko-KR" altLang="en-US" sz="2000" dirty="0"/>
+          </a:p>
+        </p:txBody>
+      </p:sp>
+      <p:pic>
+        <p:nvPicPr>
+          <p:cNvPr id="6" name="그림 5">
+            <a:extLst>
+              <a:ext uri="{FF2B5EF4-FFF2-40B4-BE49-F238E27FC236}">
+                <a16:creationId xmlns:a16="http://schemas.microsoft.com/office/drawing/2014/main" id="{5F98B662-EAC9-5A6C-7E83-5014992BCFC0}"/>
+              </a:ext>
+            </a:extLst>
+          </p:cNvPr>
+          <p:cNvPicPr>
+            <a:picLocks noChangeAspect="1"/>
+          </p:cNvPicPr>
+          <p:nvPr/>
+        </p:nvPicPr>
+        <p:blipFill>
+          <a:blip r:embed="rId2"/>
+          <a:stretch>
+            <a:fillRect/>
+          </a:stretch>
+        </p:blipFill>
+        <p:spPr>
+          <a:xfrm>
+            <a:off x="8611779" y="0"/>
+            <a:ext cx="2153013" cy="6858000"/>
+          </a:xfrm>
+          <a:prstGeom prst="rect">
+            <a:avLst/>
+          </a:prstGeom>
+        </p:spPr>
+      </p:pic>
+      <p:pic>
+        <p:nvPicPr>
+          <p:cNvPr id="8" name="그림 7">
+            <a:extLst>
+              <a:ext uri="{FF2B5EF4-FFF2-40B4-BE49-F238E27FC236}">
+                <a16:creationId xmlns:a16="http://schemas.microsoft.com/office/drawing/2014/main" id="{795D2270-D550-F62B-FC78-13B54EA0EE11}"/>
+              </a:ext>
+            </a:extLst>
+          </p:cNvPr>
+          <p:cNvPicPr>
+            <a:picLocks noChangeAspect="1"/>
+          </p:cNvPicPr>
+          <p:nvPr/>
+        </p:nvPicPr>
+        <p:blipFill>
+          <a:blip r:embed="rId3"/>
+          <a:stretch>
+            <a:fillRect/>
+          </a:stretch>
+        </p:blipFill>
+        <p:spPr>
+          <a:xfrm>
+            <a:off x="0" y="476794"/>
+            <a:ext cx="6951239" cy="6381206"/>
+          </a:xfrm>
+          <a:prstGeom prst="rect">
+            <a:avLst/>
+          </a:prstGeom>
+        </p:spPr>
+      </p:pic>
     </p:spTree>
     <p:extLst>
       <p:ext uri="{BB962C8B-B14F-4D97-AF65-F5344CB8AC3E}">
@@ -4300,11 +4836,108 @@
           <a:p>
             <a:r>
               <a:rPr lang="ko-KR" altLang="en-US" sz="2000" dirty="0"/>
-              <a:t>슬라이드 페이지 실습</a:t>
-            </a:r>
-          </a:p>
-        </p:txBody>
-      </p:sp>
+              <a:t>슬라이드 </a:t>
+            </a:r>
+            <a:r>
+              <a:rPr lang="en-US" altLang="ko-KR" sz="2000" dirty="0"/>
+              <a:t>25</a:t>
+            </a:r>
+            <a:r>
+              <a:rPr lang="ko-KR" altLang="en-US" sz="2000" dirty="0"/>
+              <a:t>페이지 </a:t>
+            </a:r>
+            <a:r>
+              <a:rPr lang="en-US" altLang="ko-KR" sz="2000" dirty="0"/>
+              <a:t>basic</a:t>
+            </a:r>
+            <a:r>
+              <a:rPr lang="ko-KR" altLang="en-US" sz="2000" dirty="0"/>
+              <a:t> </a:t>
+            </a:r>
+            <a:r>
+              <a:rPr lang="en-US" altLang="ko-KR" sz="2000" dirty="0"/>
+              <a:t>1</a:t>
+            </a:r>
+            <a:r>
+              <a:rPr lang="ko-KR" altLang="en-US" sz="2000" dirty="0"/>
+              <a:t> 실습 </a:t>
+            </a:r>
+            <a:r>
+              <a:rPr lang="en-US" altLang="ko-KR" sz="2000" dirty="0"/>
+              <a:t>– create</a:t>
+            </a:r>
+            <a:r>
+              <a:rPr lang="ko-KR" altLang="en-US" sz="2000" dirty="0"/>
+              <a:t> </a:t>
+            </a:r>
+            <a:r>
+              <a:rPr lang="en-US" altLang="ko-KR" sz="2000" dirty="0"/>
+              <a:t>table</a:t>
+            </a:r>
+            <a:endParaRPr lang="ko-KR" altLang="en-US" sz="2000" dirty="0"/>
+          </a:p>
+        </p:txBody>
+      </p:sp>
+      <p:pic>
+        <p:nvPicPr>
+          <p:cNvPr id="6" name="그림 5">
+            <a:extLst>
+              <a:ext uri="{FF2B5EF4-FFF2-40B4-BE49-F238E27FC236}">
+                <a16:creationId xmlns:a16="http://schemas.microsoft.com/office/drawing/2014/main" id="{4BF84AEA-D43A-D501-5789-B20BB907911B}"/>
+              </a:ext>
+            </a:extLst>
+          </p:cNvPr>
+          <p:cNvPicPr>
+            <a:picLocks noChangeAspect="1"/>
+          </p:cNvPicPr>
+          <p:nvPr/>
+        </p:nvPicPr>
+        <p:blipFill>
+          <a:blip r:embed="rId2"/>
+          <a:stretch>
+            <a:fillRect/>
+          </a:stretch>
+        </p:blipFill>
+        <p:spPr>
+          <a:xfrm>
+            <a:off x="9514480" y="2787764"/>
+            <a:ext cx="1584228" cy="1282470"/>
+          </a:xfrm>
+          <a:prstGeom prst="rect">
+            <a:avLst/>
+          </a:prstGeom>
+        </p:spPr>
+      </p:pic>
+      <p:pic>
+        <p:nvPicPr>
+          <p:cNvPr id="8" name="그림 7">
+            <a:extLst>
+              <a:ext uri="{FF2B5EF4-FFF2-40B4-BE49-F238E27FC236}">
+                <a16:creationId xmlns:a16="http://schemas.microsoft.com/office/drawing/2014/main" id="{F81D316C-7060-EE8E-4FBC-A40D1E841AB6}"/>
+              </a:ext>
+            </a:extLst>
+          </p:cNvPr>
+          <p:cNvPicPr>
+            <a:picLocks noChangeAspect="1"/>
+          </p:cNvPicPr>
+          <p:nvPr/>
+        </p:nvPicPr>
+        <p:blipFill>
+          <a:blip r:embed="rId3"/>
+          <a:stretch>
+            <a:fillRect/>
+          </a:stretch>
+        </p:blipFill>
+        <p:spPr>
+          <a:xfrm>
+            <a:off x="0" y="1228417"/>
+            <a:ext cx="8545118" cy="4401164"/>
+          </a:xfrm>
+          <a:prstGeom prst="rect">
+            <a:avLst/>
+          </a:prstGeom>
+        </p:spPr>
+      </p:pic>
     </p:spTree>
     <p:extLst>
       <p:ext uri="{BB962C8B-B14F-4D97-AF65-F5344CB8AC3E}">
@@ -4365,11 +4998,78 @@
           <a:p>
             <a:r>
               <a:rPr lang="ko-KR" altLang="en-US" sz="2000" dirty="0"/>
-              <a:t>슬라이드 페이지 실습</a:t>
-            </a:r>
-          </a:p>
-        </p:txBody>
-      </p:sp>
+              <a:t>슬라이드 </a:t>
+            </a:r>
+            <a:r>
+              <a:rPr lang="en-US" altLang="ko-KR" sz="2000" dirty="0"/>
+              <a:t>25</a:t>
+            </a:r>
+            <a:r>
+              <a:rPr lang="ko-KR" altLang="en-US" sz="2000" dirty="0"/>
+              <a:t>페이지 </a:t>
+            </a:r>
+            <a:r>
+              <a:rPr lang="en-US" altLang="ko-KR" sz="2000" dirty="0"/>
+              <a:t>basic</a:t>
+            </a:r>
+            <a:r>
+              <a:rPr lang="ko-KR" altLang="en-US" sz="2000" dirty="0"/>
+              <a:t> </a:t>
+            </a:r>
+            <a:r>
+              <a:rPr lang="en-US" altLang="ko-KR" sz="2000" dirty="0"/>
+              <a:t>1</a:t>
+            </a:r>
+            <a:r>
+              <a:rPr lang="ko-KR" altLang="en-US" sz="2000" dirty="0"/>
+              <a:t> 실습 </a:t>
+            </a:r>
+            <a:r>
+              <a:rPr lang="en-US" altLang="ko-KR" sz="2000" dirty="0"/>
+              <a:t>– drop</a:t>
+            </a:r>
+            <a:r>
+              <a:rPr lang="ko-KR" altLang="en-US" sz="2000" dirty="0"/>
+              <a:t> </a:t>
+            </a:r>
+            <a:r>
+              <a:rPr lang="en-US" altLang="ko-KR" sz="2000" dirty="0"/>
+              <a:t>table</a:t>
+            </a:r>
+            <a:endParaRPr lang="ko-KR" altLang="en-US" sz="2000" dirty="0"/>
+          </a:p>
+        </p:txBody>
+      </p:sp>
+      <p:pic>
+        <p:nvPicPr>
+          <p:cNvPr id="6" name="그림 5">
+            <a:extLst>
+              <a:ext uri="{FF2B5EF4-FFF2-40B4-BE49-F238E27FC236}">
+                <a16:creationId xmlns:a16="http://schemas.microsoft.com/office/drawing/2014/main" id="{BB4CD91C-756A-8C87-EEE7-7D6F48990305}"/>
+              </a:ext>
+            </a:extLst>
+          </p:cNvPr>
+          <p:cNvPicPr>
+            <a:picLocks noChangeAspect="1"/>
+          </p:cNvPicPr>
+          <p:nvPr/>
+        </p:nvPicPr>
+        <p:blipFill>
+          <a:blip r:embed="rId2"/>
+          <a:stretch>
+            <a:fillRect/>
+          </a:stretch>
+        </p:blipFill>
+        <p:spPr>
+          <a:xfrm>
+            <a:off x="1160262" y="2316482"/>
+            <a:ext cx="9871475" cy="2225035"/>
+          </a:xfrm>
+          <a:prstGeom prst="rect">
+            <a:avLst/>
+          </a:prstGeom>
+        </p:spPr>
+      </p:pic>
     </p:spTree>
     <p:extLst>
       <p:ext uri="{BB962C8B-B14F-4D97-AF65-F5344CB8AC3E}">
@@ -4430,11 +5130,70 @@
           <a:p>
             <a:r>
               <a:rPr lang="ko-KR" altLang="en-US" sz="2000" dirty="0"/>
-              <a:t>슬라이드 페이지 실습</a:t>
-            </a:r>
-          </a:p>
-        </p:txBody>
-      </p:sp>
+              <a:t>슬라이드 </a:t>
+            </a:r>
+            <a:r>
+              <a:rPr lang="en-US" altLang="ko-KR" sz="2000" dirty="0"/>
+              <a:t>25</a:t>
+            </a:r>
+            <a:r>
+              <a:rPr lang="ko-KR" altLang="en-US" sz="2000" dirty="0"/>
+              <a:t>페이지 </a:t>
+            </a:r>
+            <a:r>
+              <a:rPr lang="en-US" altLang="ko-KR" sz="2000" dirty="0"/>
+              <a:t>basic</a:t>
+            </a:r>
+            <a:r>
+              <a:rPr lang="ko-KR" altLang="en-US" sz="2000" dirty="0"/>
+              <a:t> </a:t>
+            </a:r>
+            <a:r>
+              <a:rPr lang="en-US" altLang="ko-KR" sz="2000" dirty="0"/>
+              <a:t>1</a:t>
+            </a:r>
+            <a:r>
+              <a:rPr lang="ko-KR" altLang="en-US" sz="2000" dirty="0"/>
+              <a:t> 실습 </a:t>
+            </a:r>
+            <a:r>
+              <a:rPr lang="en-US" altLang="ko-KR" sz="2000" dirty="0"/>
+              <a:t>– insert data</a:t>
+            </a:r>
+            <a:endParaRPr lang="ko-KR" altLang="en-US" sz="2000" dirty="0"/>
+          </a:p>
+        </p:txBody>
+      </p:sp>
+      <p:pic>
+        <p:nvPicPr>
+          <p:cNvPr id="6" name="그림 5">
+            <a:extLst>
+              <a:ext uri="{FF2B5EF4-FFF2-40B4-BE49-F238E27FC236}">
+                <a16:creationId xmlns:a16="http://schemas.microsoft.com/office/drawing/2014/main" id="{B489DD82-C4A7-4D25-883C-5D9E2DCFA827}"/>
+              </a:ext>
+            </a:extLst>
+          </p:cNvPr>
+          <p:cNvPicPr>
+            <a:picLocks noChangeAspect="1"/>
+          </p:cNvPicPr>
+          <p:nvPr/>
+        </p:nvPicPr>
+        <p:blipFill>
+          <a:blip r:embed="rId2"/>
+          <a:stretch>
+            <a:fillRect/>
+          </a:stretch>
+        </p:blipFill>
+        <p:spPr>
+          <a:xfrm>
+            <a:off x="1788607" y="359872"/>
+            <a:ext cx="8614786" cy="6138256"/>
+          </a:xfrm>
+          <a:prstGeom prst="rect">
+            <a:avLst/>
+          </a:prstGeom>
+        </p:spPr>
+      </p:pic>
     </p:spTree>
     <p:extLst>
       <p:ext uri="{BB962C8B-B14F-4D97-AF65-F5344CB8AC3E}">
@@ -4495,7 +5254,181 @@
           <a:p>
             <a:r>
               <a:rPr lang="ko-KR" altLang="en-US" sz="2000" dirty="0"/>
-              <a:t>슬라이드 페이지 실습</a:t>
+              <a:t>슬라이드 </a:t>
+            </a:r>
+            <a:r>
+              <a:rPr lang="en-US" altLang="ko-KR" sz="2000" dirty="0"/>
+              <a:t>25</a:t>
+            </a:r>
+            <a:r>
+              <a:rPr lang="ko-KR" altLang="en-US" sz="2000" dirty="0"/>
+              <a:t>페이지 </a:t>
+            </a:r>
+            <a:r>
+              <a:rPr lang="en-US" altLang="ko-KR" sz="2000" dirty="0"/>
+              <a:t>basic</a:t>
+            </a:r>
+            <a:r>
+              <a:rPr lang="ko-KR" altLang="en-US" sz="2000" dirty="0"/>
+              <a:t> </a:t>
+            </a:r>
+            <a:r>
+              <a:rPr lang="en-US" altLang="ko-KR" sz="2000" dirty="0"/>
+              <a:t>1</a:t>
+            </a:r>
+            <a:r>
+              <a:rPr lang="ko-KR" altLang="en-US" sz="2000" dirty="0"/>
+              <a:t> 실습 </a:t>
+            </a:r>
+            <a:r>
+              <a:rPr lang="en-US" altLang="ko-KR" sz="2000" dirty="0"/>
+              <a:t>– insert data</a:t>
+            </a:r>
+            <a:endParaRPr lang="ko-KR" altLang="en-US" sz="2000" dirty="0"/>
+          </a:p>
+        </p:txBody>
+      </p:sp>
+      <p:pic>
+        <p:nvPicPr>
+          <p:cNvPr id="5" name="그림 4">
+            <a:extLst>
+              <a:ext uri="{FF2B5EF4-FFF2-40B4-BE49-F238E27FC236}">
+                <a16:creationId xmlns:a16="http://schemas.microsoft.com/office/drawing/2014/main" id="{D8398ED2-9372-028E-E0FE-E308DE8E31E1}"/>
+              </a:ext>
+            </a:extLst>
+          </p:cNvPr>
+          <p:cNvPicPr>
+            <a:picLocks noChangeAspect="1"/>
+          </p:cNvPicPr>
+          <p:nvPr/>
+        </p:nvPicPr>
+        <p:blipFill>
+          <a:blip r:embed="rId2"/>
+          <a:stretch>
+            <a:fillRect/>
+          </a:stretch>
+        </p:blipFill>
+        <p:spPr>
+          <a:xfrm>
+            <a:off x="4871679" y="1550195"/>
+            <a:ext cx="2448640" cy="1545703"/>
+          </a:xfrm>
+          <a:prstGeom prst="rect">
+            <a:avLst/>
+          </a:prstGeom>
+        </p:spPr>
+      </p:pic>
+      <p:pic>
+        <p:nvPicPr>
+          <p:cNvPr id="7" name="그림 6">
+            <a:extLst>
+              <a:ext uri="{FF2B5EF4-FFF2-40B4-BE49-F238E27FC236}">
+                <a16:creationId xmlns:a16="http://schemas.microsoft.com/office/drawing/2014/main" id="{34BA5672-A4DF-E6F8-AC6C-2442FE4C659B}"/>
+              </a:ext>
+            </a:extLst>
+          </p:cNvPr>
+          <p:cNvPicPr>
+            <a:picLocks noChangeAspect="1"/>
+          </p:cNvPicPr>
+          <p:nvPr/>
+        </p:nvPicPr>
+        <p:blipFill>
+          <a:blip r:embed="rId3"/>
+          <a:stretch>
+            <a:fillRect/>
+          </a:stretch>
+        </p:blipFill>
+        <p:spPr>
+          <a:xfrm>
+            <a:off x="1927473" y="4169299"/>
+            <a:ext cx="4168527" cy="476793"/>
+          </a:xfrm>
+          <a:prstGeom prst="rect">
+            <a:avLst/>
+          </a:prstGeom>
+        </p:spPr>
+      </p:pic>
+      <p:pic>
+        <p:nvPicPr>
+          <p:cNvPr id="9" name="그림 8">
+            <a:extLst>
+              <a:ext uri="{FF2B5EF4-FFF2-40B4-BE49-F238E27FC236}">
+                <a16:creationId xmlns:a16="http://schemas.microsoft.com/office/drawing/2014/main" id="{B89083C3-AF53-5CAF-500F-5D2CCC6C3917}"/>
+              </a:ext>
+            </a:extLst>
+          </p:cNvPr>
+          <p:cNvPicPr>
+            <a:picLocks noChangeAspect="1"/>
+          </p:cNvPicPr>
+          <p:nvPr/>
+        </p:nvPicPr>
+        <p:blipFill>
+          <a:blip r:embed="rId4"/>
+          <a:stretch>
+            <a:fillRect/>
+          </a:stretch>
+        </p:blipFill>
+        <p:spPr>
+          <a:xfrm>
+            <a:off x="7320319" y="3925611"/>
+            <a:ext cx="1805253" cy="964168"/>
+          </a:xfrm>
+          <a:prstGeom prst="rect">
+            <a:avLst/>
+          </a:prstGeom>
+        </p:spPr>
+      </p:pic>
+      <p:sp>
+        <p:nvSpPr>
+          <p:cNvPr id="10" name="TextBox 9">
+            <a:extLst>
+              <a:ext uri="{FF2B5EF4-FFF2-40B4-BE49-F238E27FC236}">
+                <a16:creationId xmlns:a16="http://schemas.microsoft.com/office/drawing/2014/main" id="{ED12B987-3223-07DB-16EE-64138AE2CC65}"/>
+              </a:ext>
+            </a:extLst>
+          </p:cNvPr>
+          <p:cNvSpPr txBox="1"/>
+          <p:nvPr/>
+        </p:nvSpPr>
+        <p:spPr>
+          <a:xfrm>
+            <a:off x="3261359" y="5534826"/>
+            <a:ext cx="5669280" cy="369332"/>
+          </a:xfrm>
+          <a:prstGeom prst="rect">
+            <a:avLst/>
+          </a:prstGeom>
+          <a:noFill/>
+        </p:spPr>
+        <p:txBody>
+          <a:bodyPr wrap="square" rtlCol="0">
+            <a:spAutoFit/>
+          </a:bodyPr>
+          <a:lstStyle/>
+          <a:p>
+            <a:r>
+              <a:rPr lang="en-US" altLang="ko-KR" dirty="0"/>
+              <a:t>Eclipse</a:t>
+            </a:r>
+            <a:r>
+              <a:rPr lang="ko-KR" altLang="en-US" dirty="0"/>
+              <a:t>에서는 </a:t>
+            </a:r>
+            <a:r>
+              <a:rPr lang="en-US" altLang="ko-KR" dirty="0"/>
+              <a:t>0</a:t>
+            </a:r>
+            <a:r>
+              <a:rPr lang="ko-KR" altLang="en-US" dirty="0"/>
+              <a:t>번째부터 </a:t>
+            </a:r>
+            <a:r>
+              <a:rPr lang="en-US" altLang="ko-KR" dirty="0"/>
+              <a:t>count</a:t>
+            </a:r>
+            <a:r>
+              <a:rPr lang="ko-KR" altLang="en-US" dirty="0"/>
+              <a:t>가 되므로 개수가 동일</a:t>
             </a:r>
           </a:p>
         </p:txBody>
@@ -4503,7 +5436,7 @@
     </p:spTree>
     <p:extLst>
       <p:ext uri="{BB962C8B-B14F-4D97-AF65-F5344CB8AC3E}">
-        <p14:creationId xmlns:p14="http://schemas.microsoft.com/office/powerpoint/2010/main" val="1966065978"/>
+        <p14:creationId xmlns:p14="http://schemas.microsoft.com/office/powerpoint/2010/main" val="4145246953"/>
       </p:ext>
     </p:extLst>
   </p:cSld>
@@ -4575,10 +5508,10 @@
       </p:sp>
       <p:pic>
         <p:nvPicPr>
-          <p:cNvPr id="4" name="그림 3">
+          <p:cNvPr id="10" name="그림 9">
             <a:extLst>
               <a:ext uri="{FF2B5EF4-FFF2-40B4-BE49-F238E27FC236}">
-                <a16:creationId xmlns:a16="http://schemas.microsoft.com/office/drawing/2014/main" id="{3E13D46D-D951-75C2-7BE4-E9E2697EE0D6}"/>
+                <a16:creationId xmlns:a16="http://schemas.microsoft.com/office/drawing/2014/main" id="{F9804478-E1B2-55AB-2670-376FB185BF80}"/>
               </a:ext>
             </a:extLst>
           </p:cNvPr>
@@ -4595,8 +5528,8 @@
         </p:blipFill>
         <p:spPr>
           <a:xfrm>
-            <a:off x="705394" y="2090550"/>
-            <a:ext cx="8068801" cy="2676899"/>
+            <a:off x="9584160" y="2762275"/>
+            <a:ext cx="2353945" cy="1333448"/>
           </a:xfrm>
           <a:prstGeom prst="rect">
             <a:avLst/>
@@ -4605,10 +5538,10 @@
       </p:pic>
       <p:pic>
         <p:nvPicPr>
-          <p:cNvPr id="10" name="그림 9">
+          <p:cNvPr id="14" name="그림 13">
             <a:extLst>
               <a:ext uri="{FF2B5EF4-FFF2-40B4-BE49-F238E27FC236}">
-                <a16:creationId xmlns:a16="http://schemas.microsoft.com/office/drawing/2014/main" id="{F9804478-E1B2-55AB-2670-376FB185BF80}"/>
+                <a16:creationId xmlns:a16="http://schemas.microsoft.com/office/drawing/2014/main" id="{87DD359B-8401-C878-9C0B-2BBA14184F4C}"/>
               </a:ext>
             </a:extLst>
           </p:cNvPr>
@@ -4625,8 +5558,8 @@
         </p:blipFill>
         <p:spPr>
           <a:xfrm>
-            <a:off x="9584160" y="2762275"/>
-            <a:ext cx="2353945" cy="1333448"/>
+            <a:off x="149392" y="2126713"/>
+            <a:ext cx="8609564" cy="2604574"/>
           </a:xfrm>
           <a:prstGeom prst="rect">
             <a:avLst/>
@@ -4637,6 +5570,1018 @@
     <p:extLst>
       <p:ext uri="{BB962C8B-B14F-4D97-AF65-F5344CB8AC3E}">
         <p14:creationId xmlns:p14="http://schemas.microsoft.com/office/powerpoint/2010/main" val="214287945"/>
+      </p:ext>
+    </p:extLst>
+  </p:cSld>
+  <p:clrMapOvr>
+    <a:masterClrMapping/>
+  </p:clrMapOvr>
+</p:sld>
+</file>
+
+<file path=ppt/slides/slide20.xml><?xml version="1.0" encoding="utf-8"?>
+<p:sld xmlns:a="http://schemas.openxmlformats.org/drawingml/2006/main" xmlns:r="http://schemas.openxmlformats.org/officeDocument/2006/relationships" xmlns:p="http://schemas.openxmlformats.org/presentationml/2006/main">
+  <p:cSld>
+    <p:spTree>
+      <p:nvGrpSpPr>
+        <p:cNvPr id="1" name=""/>
+        <p:cNvGrpSpPr/>
+        <p:nvPr/>
+      </p:nvGrpSpPr>
+      <p:grpSpPr>
+        <a:xfrm>
+          <a:off x="0" y="0"/>
+          <a:ext cx="0" cy="0"/>
+          <a:chOff x="0" y="0"/>
+          <a:chExt cx="0" cy="0"/>
+        </a:xfrm>
+      </p:grpSpPr>
+      <p:sp>
+        <p:nvSpPr>
+          <p:cNvPr id="2" name="제목 1">
+            <a:extLst>
+              <a:ext uri="{FF2B5EF4-FFF2-40B4-BE49-F238E27FC236}">
+                <a16:creationId xmlns:a16="http://schemas.microsoft.com/office/drawing/2014/main" id="{2D7E6B8A-E1FD-472B-F033-346AC9F27163}"/>
+              </a:ext>
+            </a:extLst>
+          </p:cNvPr>
+          <p:cNvSpPr>
+            <a:spLocks noGrp="1"/>
+          </p:cNvSpPr>
+          <p:nvPr>
+            <p:ph type="title"/>
+          </p:nvPr>
+        </p:nvSpPr>
+        <p:spPr>
+          <a:xfrm>
+            <a:off x="705394" y="0"/>
+            <a:ext cx="9601200" cy="476794"/>
+          </a:xfrm>
+        </p:spPr>
+        <p:txBody>
+          <a:bodyPr>
+            <a:normAutofit/>
+          </a:bodyPr>
+          <a:lstStyle/>
+          <a:p>
+            <a:r>
+              <a:rPr lang="ko-KR" altLang="en-US" sz="2000" dirty="0"/>
+              <a:t>슬라이드 </a:t>
+            </a:r>
+            <a:r>
+              <a:rPr lang="en-US" altLang="ko-KR" sz="2000" dirty="0"/>
+              <a:t>25</a:t>
+            </a:r>
+            <a:r>
+              <a:rPr lang="ko-KR" altLang="en-US" sz="2000" dirty="0"/>
+              <a:t>페이지 </a:t>
+            </a:r>
+            <a:r>
+              <a:rPr lang="en-US" altLang="ko-KR" sz="2000" dirty="0"/>
+              <a:t>basic</a:t>
+            </a:r>
+            <a:r>
+              <a:rPr lang="ko-KR" altLang="en-US" sz="2000" dirty="0"/>
+              <a:t> </a:t>
+            </a:r>
+            <a:r>
+              <a:rPr lang="en-US" altLang="ko-KR" sz="2000" dirty="0"/>
+              <a:t>1</a:t>
+            </a:r>
+            <a:r>
+              <a:rPr lang="ko-KR" altLang="en-US" sz="2000" dirty="0"/>
+              <a:t> 실습 </a:t>
+            </a:r>
+            <a:r>
+              <a:rPr lang="en-US" altLang="ko-KR" sz="2000" dirty="0"/>
+              <a:t>– </a:t>
+            </a:r>
+            <a:r>
+              <a:rPr lang="ko-KR" altLang="en-US" sz="2000" dirty="0"/>
+              <a:t>가장 가까운 거리 찾기</a:t>
+            </a:r>
+          </a:p>
+        </p:txBody>
+      </p:sp>
+      <p:pic>
+        <p:nvPicPr>
+          <p:cNvPr id="4" name="그림 3">
+            <a:extLst>
+              <a:ext uri="{FF2B5EF4-FFF2-40B4-BE49-F238E27FC236}">
+                <a16:creationId xmlns:a16="http://schemas.microsoft.com/office/drawing/2014/main" id="{C3B2269F-D15B-CDD9-D17E-018D41680DC8}"/>
+              </a:ext>
+            </a:extLst>
+          </p:cNvPr>
+          <p:cNvPicPr>
+            <a:picLocks noChangeAspect="1"/>
+          </p:cNvPicPr>
+          <p:nvPr/>
+        </p:nvPicPr>
+        <p:blipFill>
+          <a:blip r:embed="rId2"/>
+          <a:stretch>
+            <a:fillRect/>
+          </a:stretch>
+        </p:blipFill>
+        <p:spPr>
+          <a:xfrm>
+            <a:off x="0" y="509451"/>
+            <a:ext cx="7952865" cy="5839097"/>
+          </a:xfrm>
+          <a:prstGeom prst="rect">
+            <a:avLst/>
+          </a:prstGeom>
+        </p:spPr>
+      </p:pic>
+      <p:pic>
+        <p:nvPicPr>
+          <p:cNvPr id="6" name="그림 5">
+            <a:extLst>
+              <a:ext uri="{FF2B5EF4-FFF2-40B4-BE49-F238E27FC236}">
+                <a16:creationId xmlns:a16="http://schemas.microsoft.com/office/drawing/2014/main" id="{D372EE91-AAAD-D421-FCA8-299C9C0F153C}"/>
+              </a:ext>
+            </a:extLst>
+          </p:cNvPr>
+          <p:cNvPicPr>
+            <a:picLocks noChangeAspect="1"/>
+          </p:cNvPicPr>
+          <p:nvPr/>
+        </p:nvPicPr>
+        <p:blipFill>
+          <a:blip r:embed="rId3"/>
+          <a:stretch>
+            <a:fillRect/>
+          </a:stretch>
+        </p:blipFill>
+        <p:spPr>
+          <a:xfrm>
+            <a:off x="9076890" y="2190576"/>
+            <a:ext cx="3115110" cy="2476846"/>
+          </a:xfrm>
+          <a:prstGeom prst="rect">
+            <a:avLst/>
+          </a:prstGeom>
+        </p:spPr>
+      </p:pic>
+    </p:spTree>
+    <p:extLst>
+      <p:ext uri="{BB962C8B-B14F-4D97-AF65-F5344CB8AC3E}">
+        <p14:creationId xmlns:p14="http://schemas.microsoft.com/office/powerpoint/2010/main" val="1966065978"/>
+      </p:ext>
+    </p:extLst>
+  </p:cSld>
+  <p:clrMapOvr>
+    <a:masterClrMapping/>
+  </p:clrMapOvr>
+</p:sld>
+</file>
+
+<file path=ppt/slides/slide21.xml><?xml version="1.0" encoding="utf-8"?>
+<p:sld xmlns:a="http://schemas.openxmlformats.org/drawingml/2006/main" xmlns:r="http://schemas.openxmlformats.org/officeDocument/2006/relationships" xmlns:p="http://schemas.openxmlformats.org/presentationml/2006/main">
+  <p:cSld>
+    <p:spTree>
+      <p:nvGrpSpPr>
+        <p:cNvPr id="1" name=""/>
+        <p:cNvGrpSpPr/>
+        <p:nvPr/>
+      </p:nvGrpSpPr>
+      <p:grpSpPr>
+        <a:xfrm>
+          <a:off x="0" y="0"/>
+          <a:ext cx="0" cy="0"/>
+          <a:chOff x="0" y="0"/>
+          <a:chExt cx="0" cy="0"/>
+        </a:xfrm>
+      </p:grpSpPr>
+      <p:sp>
+        <p:nvSpPr>
+          <p:cNvPr id="2" name="제목 1">
+            <a:extLst>
+              <a:ext uri="{FF2B5EF4-FFF2-40B4-BE49-F238E27FC236}">
+                <a16:creationId xmlns:a16="http://schemas.microsoft.com/office/drawing/2014/main" id="{2D7E6B8A-E1FD-472B-F033-346AC9F27163}"/>
+              </a:ext>
+            </a:extLst>
+          </p:cNvPr>
+          <p:cNvSpPr>
+            <a:spLocks noGrp="1"/>
+          </p:cNvSpPr>
+          <p:nvPr>
+            <p:ph type="title"/>
+          </p:nvPr>
+        </p:nvSpPr>
+        <p:spPr>
+          <a:xfrm>
+            <a:off x="705394" y="0"/>
+            <a:ext cx="9601200" cy="476794"/>
+          </a:xfrm>
+        </p:spPr>
+        <p:txBody>
+          <a:bodyPr>
+            <a:normAutofit/>
+          </a:bodyPr>
+          <a:lstStyle/>
+          <a:p>
+            <a:r>
+              <a:rPr lang="ko-KR" altLang="en-US" sz="2000" dirty="0"/>
+              <a:t>슬라이드 </a:t>
+            </a:r>
+            <a:r>
+              <a:rPr lang="en-US" altLang="ko-KR" sz="2000" dirty="0"/>
+              <a:t>25</a:t>
+            </a:r>
+            <a:r>
+              <a:rPr lang="ko-KR" altLang="en-US" sz="2000" dirty="0"/>
+              <a:t>페이지 </a:t>
+            </a:r>
+            <a:r>
+              <a:rPr lang="en-US" altLang="ko-KR" sz="2000" dirty="0"/>
+              <a:t>basic</a:t>
+            </a:r>
+            <a:r>
+              <a:rPr lang="ko-KR" altLang="en-US" sz="2000" dirty="0"/>
+              <a:t> </a:t>
+            </a:r>
+            <a:r>
+              <a:rPr lang="en-US" altLang="ko-KR" sz="2000" dirty="0"/>
+              <a:t>1</a:t>
+            </a:r>
+            <a:r>
+              <a:rPr lang="ko-KR" altLang="en-US" sz="2000" dirty="0"/>
+              <a:t> 실습 </a:t>
+            </a:r>
+            <a:r>
+              <a:rPr lang="en-US" altLang="ko-KR" sz="2000" dirty="0"/>
+              <a:t>– </a:t>
+            </a:r>
+            <a:r>
+              <a:rPr lang="ko-KR" altLang="en-US" sz="2000" dirty="0"/>
+              <a:t>전체 데이터 출력</a:t>
+            </a:r>
+          </a:p>
+        </p:txBody>
+      </p:sp>
+      <p:pic>
+        <p:nvPicPr>
+          <p:cNvPr id="6" name="그림 5">
+            <a:extLst>
+              <a:ext uri="{FF2B5EF4-FFF2-40B4-BE49-F238E27FC236}">
+                <a16:creationId xmlns:a16="http://schemas.microsoft.com/office/drawing/2014/main" id="{930BAB03-E9C8-8F98-B06C-36F446806FAD}"/>
+              </a:ext>
+            </a:extLst>
+          </p:cNvPr>
+          <p:cNvPicPr>
+            <a:picLocks noChangeAspect="1"/>
+          </p:cNvPicPr>
+          <p:nvPr/>
+        </p:nvPicPr>
+        <p:blipFill>
+          <a:blip r:embed="rId2"/>
+          <a:stretch>
+            <a:fillRect/>
+          </a:stretch>
+        </p:blipFill>
+        <p:spPr>
+          <a:xfrm>
+            <a:off x="1" y="718457"/>
+            <a:ext cx="8351990" cy="6139543"/>
+          </a:xfrm>
+          <a:prstGeom prst="rect">
+            <a:avLst/>
+          </a:prstGeom>
+        </p:spPr>
+      </p:pic>
+      <p:pic>
+        <p:nvPicPr>
+          <p:cNvPr id="8" name="그림 7">
+            <a:extLst>
+              <a:ext uri="{FF2B5EF4-FFF2-40B4-BE49-F238E27FC236}">
+                <a16:creationId xmlns:a16="http://schemas.microsoft.com/office/drawing/2014/main" id="{F8AB7482-0CC7-4A3D-214E-61BAEEA6A448}"/>
+              </a:ext>
+            </a:extLst>
+          </p:cNvPr>
+          <p:cNvPicPr>
+            <a:picLocks noChangeAspect="1"/>
+          </p:cNvPicPr>
+          <p:nvPr/>
+        </p:nvPicPr>
+        <p:blipFill>
+          <a:blip r:embed="rId3"/>
+          <a:stretch>
+            <a:fillRect/>
+          </a:stretch>
+        </p:blipFill>
+        <p:spPr>
+          <a:xfrm>
+            <a:off x="9176307" y="0"/>
+            <a:ext cx="2260574" cy="6858000"/>
+          </a:xfrm>
+          <a:prstGeom prst="rect">
+            <a:avLst/>
+          </a:prstGeom>
+        </p:spPr>
+      </p:pic>
+    </p:spTree>
+    <p:extLst>
+      <p:ext uri="{BB962C8B-B14F-4D97-AF65-F5344CB8AC3E}">
+        <p14:creationId xmlns:p14="http://schemas.microsoft.com/office/powerpoint/2010/main" val="2910556277"/>
+      </p:ext>
+    </p:extLst>
+  </p:cSld>
+  <p:clrMapOvr>
+    <a:masterClrMapping/>
+  </p:clrMapOvr>
+</p:sld>
+</file>
+
+<file path=ppt/slides/slide22.xml><?xml version="1.0" encoding="utf-8"?>
+<p:sld xmlns:a="http://schemas.openxmlformats.org/drawingml/2006/main" xmlns:r="http://schemas.openxmlformats.org/officeDocument/2006/relationships" xmlns:p="http://schemas.openxmlformats.org/presentationml/2006/main">
+  <p:cSld>
+    <p:spTree>
+      <p:nvGrpSpPr>
+        <p:cNvPr id="1" name=""/>
+        <p:cNvGrpSpPr/>
+        <p:nvPr/>
+      </p:nvGrpSpPr>
+      <p:grpSpPr>
+        <a:xfrm>
+          <a:off x="0" y="0"/>
+          <a:ext cx="0" cy="0"/>
+          <a:chOff x="0" y="0"/>
+          <a:chExt cx="0" cy="0"/>
+        </a:xfrm>
+      </p:grpSpPr>
+      <p:sp>
+        <p:nvSpPr>
+          <p:cNvPr id="2" name="제목 1">
+            <a:extLst>
+              <a:ext uri="{FF2B5EF4-FFF2-40B4-BE49-F238E27FC236}">
+                <a16:creationId xmlns:a16="http://schemas.microsoft.com/office/drawing/2014/main" id="{2D7E6B8A-E1FD-472B-F033-346AC9F27163}"/>
+              </a:ext>
+            </a:extLst>
+          </p:cNvPr>
+          <p:cNvSpPr>
+            <a:spLocks noGrp="1"/>
+          </p:cNvSpPr>
+          <p:nvPr>
+            <p:ph type="title"/>
+          </p:nvPr>
+        </p:nvSpPr>
+        <p:spPr>
+          <a:xfrm>
+            <a:off x="705394" y="0"/>
+            <a:ext cx="9601200" cy="476794"/>
+          </a:xfrm>
+        </p:spPr>
+        <p:txBody>
+          <a:bodyPr>
+            <a:normAutofit/>
+          </a:bodyPr>
+          <a:lstStyle/>
+          <a:p>
+            <a:r>
+              <a:rPr lang="ko-KR" altLang="en-US" sz="2000" dirty="0"/>
+              <a:t>슬라이드 </a:t>
+            </a:r>
+            <a:r>
+              <a:rPr lang="en-US" altLang="ko-KR" sz="2000" dirty="0"/>
+              <a:t>25</a:t>
+            </a:r>
+            <a:r>
+              <a:rPr lang="ko-KR" altLang="en-US" sz="2000" dirty="0"/>
+              <a:t>페이지 </a:t>
+            </a:r>
+            <a:r>
+              <a:rPr lang="en-US" altLang="ko-KR" sz="2000" dirty="0"/>
+              <a:t>basic</a:t>
+            </a:r>
+            <a:r>
+              <a:rPr lang="ko-KR" altLang="en-US" sz="2000" dirty="0"/>
+              <a:t> </a:t>
+            </a:r>
+            <a:r>
+              <a:rPr lang="en-US" altLang="ko-KR" sz="2000" dirty="0"/>
+              <a:t>1</a:t>
+            </a:r>
+            <a:r>
+              <a:rPr lang="ko-KR" altLang="en-US" sz="2000" dirty="0"/>
+              <a:t> 실습 </a:t>
+            </a:r>
+            <a:r>
+              <a:rPr lang="en-US" altLang="ko-KR" sz="2000" dirty="0"/>
+              <a:t>– where 1</a:t>
+            </a:r>
+            <a:endParaRPr lang="ko-KR" altLang="en-US" sz="2000" dirty="0"/>
+          </a:p>
+        </p:txBody>
+      </p:sp>
+      <p:pic>
+        <p:nvPicPr>
+          <p:cNvPr id="4" name="그림 3">
+            <a:extLst>
+              <a:ext uri="{FF2B5EF4-FFF2-40B4-BE49-F238E27FC236}">
+                <a16:creationId xmlns:a16="http://schemas.microsoft.com/office/drawing/2014/main" id="{A193215D-D9B0-0CC7-1B5B-63FA0B9FC0F4}"/>
+              </a:ext>
+            </a:extLst>
+          </p:cNvPr>
+          <p:cNvPicPr>
+            <a:picLocks noChangeAspect="1"/>
+          </p:cNvPicPr>
+          <p:nvPr/>
+        </p:nvPicPr>
+        <p:blipFill>
+          <a:blip r:embed="rId2"/>
+          <a:stretch>
+            <a:fillRect/>
+          </a:stretch>
+        </p:blipFill>
+        <p:spPr>
+          <a:xfrm>
+            <a:off x="0" y="685887"/>
+            <a:ext cx="8396298" cy="6172113"/>
+          </a:xfrm>
+          <a:prstGeom prst="rect">
+            <a:avLst/>
+          </a:prstGeom>
+        </p:spPr>
+      </p:pic>
+      <p:pic>
+        <p:nvPicPr>
+          <p:cNvPr id="6" name="그림 5">
+            <a:extLst>
+              <a:ext uri="{FF2B5EF4-FFF2-40B4-BE49-F238E27FC236}">
+                <a16:creationId xmlns:a16="http://schemas.microsoft.com/office/drawing/2014/main" id="{A0F6C6A6-DF65-723D-4AE1-462851576248}"/>
+              </a:ext>
+            </a:extLst>
+          </p:cNvPr>
+          <p:cNvPicPr>
+            <a:picLocks noChangeAspect="1"/>
+          </p:cNvPicPr>
+          <p:nvPr/>
+        </p:nvPicPr>
+        <p:blipFill>
+          <a:blip r:embed="rId3"/>
+          <a:stretch>
+            <a:fillRect/>
+          </a:stretch>
+        </p:blipFill>
+        <p:spPr>
+          <a:xfrm>
+            <a:off x="9268235" y="0"/>
+            <a:ext cx="2076718" cy="6858000"/>
+          </a:xfrm>
+          <a:prstGeom prst="rect">
+            <a:avLst/>
+          </a:prstGeom>
+        </p:spPr>
+      </p:pic>
+    </p:spTree>
+    <p:extLst>
+      <p:ext uri="{BB962C8B-B14F-4D97-AF65-F5344CB8AC3E}">
+        <p14:creationId xmlns:p14="http://schemas.microsoft.com/office/powerpoint/2010/main" val="2241308285"/>
+      </p:ext>
+    </p:extLst>
+  </p:cSld>
+  <p:clrMapOvr>
+    <a:masterClrMapping/>
+  </p:clrMapOvr>
+</p:sld>
+</file>
+
+<file path=ppt/slides/slide23.xml><?xml version="1.0" encoding="utf-8"?>
+<p:sld xmlns:a="http://schemas.openxmlformats.org/drawingml/2006/main" xmlns:r="http://schemas.openxmlformats.org/officeDocument/2006/relationships" xmlns:p="http://schemas.openxmlformats.org/presentationml/2006/main">
+  <p:cSld>
+    <p:spTree>
+      <p:nvGrpSpPr>
+        <p:cNvPr id="1" name=""/>
+        <p:cNvGrpSpPr/>
+        <p:nvPr/>
+      </p:nvGrpSpPr>
+      <p:grpSpPr>
+        <a:xfrm>
+          <a:off x="0" y="0"/>
+          <a:ext cx="0" cy="0"/>
+          <a:chOff x="0" y="0"/>
+          <a:chExt cx="0" cy="0"/>
+        </a:xfrm>
+      </p:grpSpPr>
+      <p:sp>
+        <p:nvSpPr>
+          <p:cNvPr id="2" name="제목 1">
+            <a:extLst>
+              <a:ext uri="{FF2B5EF4-FFF2-40B4-BE49-F238E27FC236}">
+                <a16:creationId xmlns:a16="http://schemas.microsoft.com/office/drawing/2014/main" id="{2D7E6B8A-E1FD-472B-F033-346AC9F27163}"/>
+              </a:ext>
+            </a:extLst>
+          </p:cNvPr>
+          <p:cNvSpPr>
+            <a:spLocks noGrp="1"/>
+          </p:cNvSpPr>
+          <p:nvPr>
+            <p:ph type="title"/>
+          </p:nvPr>
+        </p:nvSpPr>
+        <p:spPr>
+          <a:xfrm>
+            <a:off x="705394" y="0"/>
+            <a:ext cx="9601200" cy="476794"/>
+          </a:xfrm>
+        </p:spPr>
+        <p:txBody>
+          <a:bodyPr>
+            <a:normAutofit/>
+          </a:bodyPr>
+          <a:lstStyle/>
+          <a:p>
+            <a:r>
+              <a:rPr lang="ko-KR" altLang="en-US" sz="2000" dirty="0"/>
+              <a:t>슬라이드 </a:t>
+            </a:r>
+            <a:r>
+              <a:rPr lang="en-US" altLang="ko-KR" sz="2000" dirty="0"/>
+              <a:t>25</a:t>
+            </a:r>
+            <a:r>
+              <a:rPr lang="ko-KR" altLang="en-US" sz="2000" dirty="0"/>
+              <a:t>페이지 </a:t>
+            </a:r>
+            <a:r>
+              <a:rPr lang="en-US" altLang="ko-KR" sz="2000" dirty="0"/>
+              <a:t>basic</a:t>
+            </a:r>
+            <a:r>
+              <a:rPr lang="ko-KR" altLang="en-US" sz="2000" dirty="0"/>
+              <a:t> </a:t>
+            </a:r>
+            <a:r>
+              <a:rPr lang="en-US" altLang="ko-KR" sz="2000" dirty="0"/>
+              <a:t>1</a:t>
+            </a:r>
+            <a:r>
+              <a:rPr lang="ko-KR" altLang="en-US" sz="2000" dirty="0"/>
+              <a:t> 실습 </a:t>
+            </a:r>
+            <a:r>
+              <a:rPr lang="en-US" altLang="ko-KR" sz="2000" dirty="0"/>
+              <a:t>– where 2</a:t>
+            </a:r>
+            <a:endParaRPr lang="ko-KR" altLang="en-US" sz="2000" dirty="0"/>
+          </a:p>
+        </p:txBody>
+      </p:sp>
+      <p:pic>
+        <p:nvPicPr>
+          <p:cNvPr id="4" name="그림 3">
+            <a:extLst>
+              <a:ext uri="{FF2B5EF4-FFF2-40B4-BE49-F238E27FC236}">
+                <a16:creationId xmlns:a16="http://schemas.microsoft.com/office/drawing/2014/main" id="{BF6A34C7-9E90-A36B-54AA-02189946F5B6}"/>
+              </a:ext>
+            </a:extLst>
+          </p:cNvPr>
+          <p:cNvPicPr>
+            <a:picLocks noChangeAspect="1"/>
+          </p:cNvPicPr>
+          <p:nvPr/>
+        </p:nvPicPr>
+        <p:blipFill>
+          <a:blip r:embed="rId2"/>
+          <a:stretch>
+            <a:fillRect/>
+          </a:stretch>
+        </p:blipFill>
+        <p:spPr>
+          <a:xfrm>
+            <a:off x="9249923" y="0"/>
+            <a:ext cx="2113342" cy="6858000"/>
+          </a:xfrm>
+          <a:prstGeom prst="rect">
+            <a:avLst/>
+          </a:prstGeom>
+        </p:spPr>
+      </p:pic>
+      <p:pic>
+        <p:nvPicPr>
+          <p:cNvPr id="6" name="그림 5">
+            <a:extLst>
+              <a:ext uri="{FF2B5EF4-FFF2-40B4-BE49-F238E27FC236}">
+                <a16:creationId xmlns:a16="http://schemas.microsoft.com/office/drawing/2014/main" id="{23714375-0C09-CB58-9136-67DA6793B1AE}"/>
+              </a:ext>
+            </a:extLst>
+          </p:cNvPr>
+          <p:cNvPicPr>
+            <a:picLocks noChangeAspect="1"/>
+          </p:cNvPicPr>
+          <p:nvPr/>
+        </p:nvPicPr>
+        <p:blipFill>
+          <a:blip r:embed="rId3"/>
+          <a:stretch>
+            <a:fillRect/>
+          </a:stretch>
+        </p:blipFill>
+        <p:spPr>
+          <a:xfrm>
+            <a:off x="0" y="809897"/>
+            <a:ext cx="8264441" cy="6048103"/>
+          </a:xfrm>
+          <a:prstGeom prst="rect">
+            <a:avLst/>
+          </a:prstGeom>
+        </p:spPr>
+      </p:pic>
+    </p:spTree>
+    <p:extLst>
+      <p:ext uri="{BB962C8B-B14F-4D97-AF65-F5344CB8AC3E}">
+        <p14:creationId xmlns:p14="http://schemas.microsoft.com/office/powerpoint/2010/main" val="3276157475"/>
+      </p:ext>
+    </p:extLst>
+  </p:cSld>
+  <p:clrMapOvr>
+    <a:masterClrMapping/>
+  </p:clrMapOvr>
+</p:sld>
+</file>
+
+<file path=ppt/slides/slide24.xml><?xml version="1.0" encoding="utf-8"?>
+<p:sld xmlns:a="http://schemas.openxmlformats.org/drawingml/2006/main" xmlns:r="http://schemas.openxmlformats.org/officeDocument/2006/relationships" xmlns:p="http://schemas.openxmlformats.org/presentationml/2006/main">
+  <p:cSld>
+    <p:spTree>
+      <p:nvGrpSpPr>
+        <p:cNvPr id="1" name=""/>
+        <p:cNvGrpSpPr/>
+        <p:nvPr/>
+      </p:nvGrpSpPr>
+      <p:grpSpPr>
+        <a:xfrm>
+          <a:off x="0" y="0"/>
+          <a:ext cx="0" cy="0"/>
+          <a:chOff x="0" y="0"/>
+          <a:chExt cx="0" cy="0"/>
+        </a:xfrm>
+      </p:grpSpPr>
+      <p:sp>
+        <p:nvSpPr>
+          <p:cNvPr id="2" name="제목 1">
+            <a:extLst>
+              <a:ext uri="{FF2B5EF4-FFF2-40B4-BE49-F238E27FC236}">
+                <a16:creationId xmlns:a16="http://schemas.microsoft.com/office/drawing/2014/main" id="{2D7E6B8A-E1FD-472B-F033-346AC9F27163}"/>
+              </a:ext>
+            </a:extLst>
+          </p:cNvPr>
+          <p:cNvSpPr>
+            <a:spLocks noGrp="1"/>
+          </p:cNvSpPr>
+          <p:nvPr>
+            <p:ph type="title"/>
+          </p:nvPr>
+        </p:nvSpPr>
+        <p:spPr>
+          <a:xfrm>
+            <a:off x="705394" y="0"/>
+            <a:ext cx="9601200" cy="476794"/>
+          </a:xfrm>
+        </p:spPr>
+        <p:txBody>
+          <a:bodyPr>
+            <a:normAutofit/>
+          </a:bodyPr>
+          <a:lstStyle/>
+          <a:p>
+            <a:r>
+              <a:rPr lang="ko-KR" altLang="en-US" sz="2000" dirty="0"/>
+              <a:t>슬라이드 페이지 실습</a:t>
+            </a:r>
+          </a:p>
+        </p:txBody>
+      </p:sp>
+    </p:spTree>
+    <p:extLst>
+      <p:ext uri="{BB962C8B-B14F-4D97-AF65-F5344CB8AC3E}">
+        <p14:creationId xmlns:p14="http://schemas.microsoft.com/office/powerpoint/2010/main" val="3822646339"/>
+      </p:ext>
+    </p:extLst>
+  </p:cSld>
+  <p:clrMapOvr>
+    <a:masterClrMapping/>
+  </p:clrMapOvr>
+</p:sld>
+</file>
+
+<file path=ppt/slides/slide25.xml><?xml version="1.0" encoding="utf-8"?>
+<p:sld xmlns:a="http://schemas.openxmlformats.org/drawingml/2006/main" xmlns:r="http://schemas.openxmlformats.org/officeDocument/2006/relationships" xmlns:p="http://schemas.openxmlformats.org/presentationml/2006/main">
+  <p:cSld>
+    <p:spTree>
+      <p:nvGrpSpPr>
+        <p:cNvPr id="1" name=""/>
+        <p:cNvGrpSpPr/>
+        <p:nvPr/>
+      </p:nvGrpSpPr>
+      <p:grpSpPr>
+        <a:xfrm>
+          <a:off x="0" y="0"/>
+          <a:ext cx="0" cy="0"/>
+          <a:chOff x="0" y="0"/>
+          <a:chExt cx="0" cy="0"/>
+        </a:xfrm>
+      </p:grpSpPr>
+      <p:sp>
+        <p:nvSpPr>
+          <p:cNvPr id="2" name="제목 1">
+            <a:extLst>
+              <a:ext uri="{FF2B5EF4-FFF2-40B4-BE49-F238E27FC236}">
+                <a16:creationId xmlns:a16="http://schemas.microsoft.com/office/drawing/2014/main" id="{2D7E6B8A-E1FD-472B-F033-346AC9F27163}"/>
+              </a:ext>
+            </a:extLst>
+          </p:cNvPr>
+          <p:cNvSpPr>
+            <a:spLocks noGrp="1"/>
+          </p:cNvSpPr>
+          <p:nvPr>
+            <p:ph type="title"/>
+          </p:nvPr>
+        </p:nvSpPr>
+        <p:spPr>
+          <a:xfrm>
+            <a:off x="705394" y="0"/>
+            <a:ext cx="9601200" cy="476794"/>
+          </a:xfrm>
+        </p:spPr>
+        <p:txBody>
+          <a:bodyPr>
+            <a:normAutofit/>
+          </a:bodyPr>
+          <a:lstStyle/>
+          <a:p>
+            <a:r>
+              <a:rPr lang="ko-KR" altLang="en-US" sz="2000" dirty="0"/>
+              <a:t>슬라이드 페이지 실습</a:t>
+            </a:r>
+          </a:p>
+        </p:txBody>
+      </p:sp>
+    </p:spTree>
+    <p:extLst>
+      <p:ext uri="{BB962C8B-B14F-4D97-AF65-F5344CB8AC3E}">
+        <p14:creationId xmlns:p14="http://schemas.microsoft.com/office/powerpoint/2010/main" val="4138293105"/>
+      </p:ext>
+    </p:extLst>
+  </p:cSld>
+  <p:clrMapOvr>
+    <a:masterClrMapping/>
+  </p:clrMapOvr>
+</p:sld>
+</file>
+
+<file path=ppt/slides/slide26.xml><?xml version="1.0" encoding="utf-8"?>
+<p:sld xmlns:a="http://schemas.openxmlformats.org/drawingml/2006/main" xmlns:r="http://schemas.openxmlformats.org/officeDocument/2006/relationships" xmlns:p="http://schemas.openxmlformats.org/presentationml/2006/main">
+  <p:cSld>
+    <p:spTree>
+      <p:nvGrpSpPr>
+        <p:cNvPr id="1" name=""/>
+        <p:cNvGrpSpPr/>
+        <p:nvPr/>
+      </p:nvGrpSpPr>
+      <p:grpSpPr>
+        <a:xfrm>
+          <a:off x="0" y="0"/>
+          <a:ext cx="0" cy="0"/>
+          <a:chOff x="0" y="0"/>
+          <a:chExt cx="0" cy="0"/>
+        </a:xfrm>
+      </p:grpSpPr>
+      <p:sp>
+        <p:nvSpPr>
+          <p:cNvPr id="2" name="제목 1">
+            <a:extLst>
+              <a:ext uri="{FF2B5EF4-FFF2-40B4-BE49-F238E27FC236}">
+                <a16:creationId xmlns:a16="http://schemas.microsoft.com/office/drawing/2014/main" id="{2D7E6B8A-E1FD-472B-F033-346AC9F27163}"/>
+              </a:ext>
+            </a:extLst>
+          </p:cNvPr>
+          <p:cNvSpPr>
+            <a:spLocks noGrp="1"/>
+          </p:cNvSpPr>
+          <p:nvPr>
+            <p:ph type="title"/>
+          </p:nvPr>
+        </p:nvSpPr>
+        <p:spPr>
+          <a:xfrm>
+            <a:off x="705394" y="0"/>
+            <a:ext cx="9601200" cy="476794"/>
+          </a:xfrm>
+        </p:spPr>
+        <p:txBody>
+          <a:bodyPr>
+            <a:normAutofit/>
+          </a:bodyPr>
+          <a:lstStyle/>
+          <a:p>
+            <a:r>
+              <a:rPr lang="ko-KR" altLang="en-US" sz="2000" dirty="0"/>
+              <a:t>슬라이드 페이지 실습</a:t>
+            </a:r>
+          </a:p>
+        </p:txBody>
+      </p:sp>
+    </p:spTree>
+    <p:extLst>
+      <p:ext uri="{BB962C8B-B14F-4D97-AF65-F5344CB8AC3E}">
+        <p14:creationId xmlns:p14="http://schemas.microsoft.com/office/powerpoint/2010/main" val="1657728661"/>
+      </p:ext>
+    </p:extLst>
+  </p:cSld>
+  <p:clrMapOvr>
+    <a:masterClrMapping/>
+  </p:clrMapOvr>
+</p:sld>
+</file>
+
+<file path=ppt/slides/slide27.xml><?xml version="1.0" encoding="utf-8"?>
+<p:sld xmlns:a="http://schemas.openxmlformats.org/drawingml/2006/main" xmlns:r="http://schemas.openxmlformats.org/officeDocument/2006/relationships" xmlns:p="http://schemas.openxmlformats.org/presentationml/2006/main">
+  <p:cSld>
+    <p:spTree>
+      <p:nvGrpSpPr>
+        <p:cNvPr id="1" name=""/>
+        <p:cNvGrpSpPr/>
+        <p:nvPr/>
+      </p:nvGrpSpPr>
+      <p:grpSpPr>
+        <a:xfrm>
+          <a:off x="0" y="0"/>
+          <a:ext cx="0" cy="0"/>
+          <a:chOff x="0" y="0"/>
+          <a:chExt cx="0" cy="0"/>
+        </a:xfrm>
+      </p:grpSpPr>
+      <p:sp>
+        <p:nvSpPr>
+          <p:cNvPr id="2" name="제목 1">
+            <a:extLst>
+              <a:ext uri="{FF2B5EF4-FFF2-40B4-BE49-F238E27FC236}">
+                <a16:creationId xmlns:a16="http://schemas.microsoft.com/office/drawing/2014/main" id="{2D7E6B8A-E1FD-472B-F033-346AC9F27163}"/>
+              </a:ext>
+            </a:extLst>
+          </p:cNvPr>
+          <p:cNvSpPr>
+            <a:spLocks noGrp="1"/>
+          </p:cNvSpPr>
+          <p:nvPr>
+            <p:ph type="title"/>
+          </p:nvPr>
+        </p:nvSpPr>
+        <p:spPr>
+          <a:xfrm>
+            <a:off x="705394" y="0"/>
+            <a:ext cx="9601200" cy="476794"/>
+          </a:xfrm>
+        </p:spPr>
+        <p:txBody>
+          <a:bodyPr>
+            <a:normAutofit/>
+          </a:bodyPr>
+          <a:lstStyle/>
+          <a:p>
+            <a:r>
+              <a:rPr lang="ko-KR" altLang="en-US" sz="2000" dirty="0"/>
+              <a:t>슬라이드 페이지 실습</a:t>
+            </a:r>
+          </a:p>
+        </p:txBody>
+      </p:sp>
+    </p:spTree>
+    <p:extLst>
+      <p:ext uri="{BB962C8B-B14F-4D97-AF65-F5344CB8AC3E}">
+        <p14:creationId xmlns:p14="http://schemas.microsoft.com/office/powerpoint/2010/main" val="4063105050"/>
+      </p:ext>
+    </p:extLst>
+  </p:cSld>
+  <p:clrMapOvr>
+    <a:masterClrMapping/>
+  </p:clrMapOvr>
+</p:sld>
+</file>
+
+<file path=ppt/slides/slide28.xml><?xml version="1.0" encoding="utf-8"?>
+<p:sld xmlns:a="http://schemas.openxmlformats.org/drawingml/2006/main" xmlns:r="http://schemas.openxmlformats.org/officeDocument/2006/relationships" xmlns:p="http://schemas.openxmlformats.org/presentationml/2006/main">
+  <p:cSld>
+    <p:spTree>
+      <p:nvGrpSpPr>
+        <p:cNvPr id="1" name=""/>
+        <p:cNvGrpSpPr/>
+        <p:nvPr/>
+      </p:nvGrpSpPr>
+      <p:grpSpPr>
+        <a:xfrm>
+          <a:off x="0" y="0"/>
+          <a:ext cx="0" cy="0"/>
+          <a:chOff x="0" y="0"/>
+          <a:chExt cx="0" cy="0"/>
+        </a:xfrm>
+      </p:grpSpPr>
+      <p:sp>
+        <p:nvSpPr>
+          <p:cNvPr id="2" name="제목 1">
+            <a:extLst>
+              <a:ext uri="{FF2B5EF4-FFF2-40B4-BE49-F238E27FC236}">
+                <a16:creationId xmlns:a16="http://schemas.microsoft.com/office/drawing/2014/main" id="{2D7E6B8A-E1FD-472B-F033-346AC9F27163}"/>
+              </a:ext>
+            </a:extLst>
+          </p:cNvPr>
+          <p:cNvSpPr>
+            <a:spLocks noGrp="1"/>
+          </p:cNvSpPr>
+          <p:nvPr>
+            <p:ph type="title"/>
+          </p:nvPr>
+        </p:nvSpPr>
+        <p:spPr>
+          <a:xfrm>
+            <a:off x="705394" y="0"/>
+            <a:ext cx="9601200" cy="476794"/>
+          </a:xfrm>
+        </p:spPr>
+        <p:txBody>
+          <a:bodyPr>
+            <a:normAutofit/>
+          </a:bodyPr>
+          <a:lstStyle/>
+          <a:p>
+            <a:r>
+              <a:rPr lang="ko-KR" altLang="en-US" sz="2000" dirty="0"/>
+              <a:t>슬라이드 페이지 실습</a:t>
+            </a:r>
+          </a:p>
+        </p:txBody>
+      </p:sp>
+    </p:spTree>
+    <p:extLst>
+      <p:ext uri="{BB962C8B-B14F-4D97-AF65-F5344CB8AC3E}">
+        <p14:creationId xmlns:p14="http://schemas.microsoft.com/office/powerpoint/2010/main" val="3506859753"/>
+      </p:ext>
+    </p:extLst>
+  </p:cSld>
+  <p:clrMapOvr>
+    <a:masterClrMapping/>
+  </p:clrMapOvr>
+</p:sld>
+</file>
+
+<file path=ppt/slides/slide29.xml><?xml version="1.0" encoding="utf-8"?>
+<p:sld xmlns:a="http://schemas.openxmlformats.org/drawingml/2006/main" xmlns:r="http://schemas.openxmlformats.org/officeDocument/2006/relationships" xmlns:p="http://schemas.openxmlformats.org/presentationml/2006/main">
+  <p:cSld>
+    <p:spTree>
+      <p:nvGrpSpPr>
+        <p:cNvPr id="1" name=""/>
+        <p:cNvGrpSpPr/>
+        <p:nvPr/>
+      </p:nvGrpSpPr>
+      <p:grpSpPr>
+        <a:xfrm>
+          <a:off x="0" y="0"/>
+          <a:ext cx="0" cy="0"/>
+          <a:chOff x="0" y="0"/>
+          <a:chExt cx="0" cy="0"/>
+        </a:xfrm>
+      </p:grpSpPr>
+      <p:sp>
+        <p:nvSpPr>
+          <p:cNvPr id="2" name="제목 1">
+            <a:extLst>
+              <a:ext uri="{FF2B5EF4-FFF2-40B4-BE49-F238E27FC236}">
+                <a16:creationId xmlns:a16="http://schemas.microsoft.com/office/drawing/2014/main" id="{2D7E6B8A-E1FD-472B-F033-346AC9F27163}"/>
+              </a:ext>
+            </a:extLst>
+          </p:cNvPr>
+          <p:cNvSpPr>
+            <a:spLocks noGrp="1"/>
+          </p:cNvSpPr>
+          <p:nvPr>
+            <p:ph type="title"/>
+          </p:nvPr>
+        </p:nvSpPr>
+        <p:spPr>
+          <a:xfrm>
+            <a:off x="705394" y="0"/>
+            <a:ext cx="9601200" cy="476794"/>
+          </a:xfrm>
+        </p:spPr>
+        <p:txBody>
+          <a:bodyPr>
+            <a:normAutofit/>
+          </a:bodyPr>
+          <a:lstStyle/>
+          <a:p>
+            <a:r>
+              <a:rPr lang="ko-KR" altLang="en-US" sz="2000" dirty="0"/>
+              <a:t>슬라이드 페이지 실습</a:t>
+            </a:r>
+          </a:p>
+        </p:txBody>
+      </p:sp>
+    </p:spTree>
+    <p:extLst>
+      <p:ext uri="{BB962C8B-B14F-4D97-AF65-F5344CB8AC3E}">
+        <p14:creationId xmlns:p14="http://schemas.microsoft.com/office/powerpoint/2010/main" val="1234352991"/>
       </p:ext>
     </p:extLst>
   </p:cSld>
@@ -4708,36 +6653,6 @@
       </p:sp>
       <p:pic>
         <p:nvPicPr>
-          <p:cNvPr id="4" name="그림 3">
-            <a:extLst>
-              <a:ext uri="{FF2B5EF4-FFF2-40B4-BE49-F238E27FC236}">
-                <a16:creationId xmlns:a16="http://schemas.microsoft.com/office/drawing/2014/main" id="{663C90A0-87F5-09ED-CFB2-A54A8A8A48C5}"/>
-              </a:ext>
-            </a:extLst>
-          </p:cNvPr>
-          <p:cNvPicPr>
-            <a:picLocks noChangeAspect="1"/>
-          </p:cNvPicPr>
-          <p:nvPr/>
-        </p:nvPicPr>
-        <p:blipFill>
-          <a:blip r:embed="rId2"/>
-          <a:stretch>
-            <a:fillRect/>
-          </a:stretch>
-        </p:blipFill>
-        <p:spPr>
-          <a:xfrm>
-            <a:off x="2280705" y="982007"/>
-            <a:ext cx="7630590" cy="2229161"/>
-          </a:xfrm>
-          <a:prstGeom prst="rect">
-            <a:avLst/>
-          </a:prstGeom>
-        </p:spPr>
-      </p:pic>
-      <p:pic>
-        <p:nvPicPr>
           <p:cNvPr id="6" name="그림 5">
             <a:extLst>
               <a:ext uri="{FF2B5EF4-FFF2-40B4-BE49-F238E27FC236}">
@@ -4751,7 +6666,7 @@
           <p:nvPr/>
         </p:nvPicPr>
         <p:blipFill>
-          <a:blip r:embed="rId3"/>
+          <a:blip r:embed="rId2"/>
           <a:stretch>
             <a:fillRect/>
           </a:stretch>
@@ -4781,7 +6696,7 @@
           <p:nvPr/>
         </p:nvPicPr>
         <p:blipFill>
-          <a:blip r:embed="rId4"/>
+          <a:blip r:embed="rId3"/>
           <a:stretch>
             <a:fillRect/>
           </a:stretch>
@@ -4843,10 +6758,560 @@
           </a:p>
         </p:txBody>
       </p:sp>
+      <p:pic>
+        <p:nvPicPr>
+          <p:cNvPr id="11" name="그림 10">
+            <a:extLst>
+              <a:ext uri="{FF2B5EF4-FFF2-40B4-BE49-F238E27FC236}">
+                <a16:creationId xmlns:a16="http://schemas.microsoft.com/office/drawing/2014/main" id="{06B9B17E-C613-32B7-2369-CC18E1C5503A}"/>
+              </a:ext>
+            </a:extLst>
+          </p:cNvPr>
+          <p:cNvPicPr>
+            <a:picLocks noChangeAspect="1"/>
+          </p:cNvPicPr>
+          <p:nvPr/>
+        </p:nvPicPr>
+        <p:blipFill>
+          <a:blip r:embed="rId4"/>
+          <a:stretch>
+            <a:fillRect/>
+          </a:stretch>
+        </p:blipFill>
+        <p:spPr>
+          <a:xfrm>
+            <a:off x="2128284" y="815570"/>
+            <a:ext cx="7935432" cy="2267266"/>
+          </a:xfrm>
+          <a:prstGeom prst="rect">
+            <a:avLst/>
+          </a:prstGeom>
+        </p:spPr>
+      </p:pic>
     </p:spTree>
     <p:extLst>
       <p:ext uri="{BB962C8B-B14F-4D97-AF65-F5344CB8AC3E}">
         <p14:creationId xmlns:p14="http://schemas.microsoft.com/office/powerpoint/2010/main" val="23071242"/>
+      </p:ext>
+    </p:extLst>
+  </p:cSld>
+  <p:clrMapOvr>
+    <a:masterClrMapping/>
+  </p:clrMapOvr>
+</p:sld>
+</file>
+
+<file path=ppt/slides/slide30.xml><?xml version="1.0" encoding="utf-8"?>
+<p:sld xmlns:a="http://schemas.openxmlformats.org/drawingml/2006/main" xmlns:r="http://schemas.openxmlformats.org/officeDocument/2006/relationships" xmlns:p="http://schemas.openxmlformats.org/presentationml/2006/main">
+  <p:cSld>
+    <p:spTree>
+      <p:nvGrpSpPr>
+        <p:cNvPr id="1" name=""/>
+        <p:cNvGrpSpPr/>
+        <p:nvPr/>
+      </p:nvGrpSpPr>
+      <p:grpSpPr>
+        <a:xfrm>
+          <a:off x="0" y="0"/>
+          <a:ext cx="0" cy="0"/>
+          <a:chOff x="0" y="0"/>
+          <a:chExt cx="0" cy="0"/>
+        </a:xfrm>
+      </p:grpSpPr>
+      <p:sp>
+        <p:nvSpPr>
+          <p:cNvPr id="2" name="제목 1">
+            <a:extLst>
+              <a:ext uri="{FF2B5EF4-FFF2-40B4-BE49-F238E27FC236}">
+                <a16:creationId xmlns:a16="http://schemas.microsoft.com/office/drawing/2014/main" id="{2D7E6B8A-E1FD-472B-F033-346AC9F27163}"/>
+              </a:ext>
+            </a:extLst>
+          </p:cNvPr>
+          <p:cNvSpPr>
+            <a:spLocks noGrp="1"/>
+          </p:cNvSpPr>
+          <p:nvPr>
+            <p:ph type="title"/>
+          </p:nvPr>
+        </p:nvSpPr>
+        <p:spPr>
+          <a:xfrm>
+            <a:off x="705394" y="0"/>
+            <a:ext cx="9601200" cy="476794"/>
+          </a:xfrm>
+        </p:spPr>
+        <p:txBody>
+          <a:bodyPr>
+            <a:normAutofit/>
+          </a:bodyPr>
+          <a:lstStyle/>
+          <a:p>
+            <a:r>
+              <a:rPr lang="ko-KR" altLang="en-US" sz="2000" dirty="0"/>
+              <a:t>슬라이드 페이지 실습</a:t>
+            </a:r>
+          </a:p>
+        </p:txBody>
+      </p:sp>
+    </p:spTree>
+    <p:extLst>
+      <p:ext uri="{BB962C8B-B14F-4D97-AF65-F5344CB8AC3E}">
+        <p14:creationId xmlns:p14="http://schemas.microsoft.com/office/powerpoint/2010/main" val="546472021"/>
+      </p:ext>
+    </p:extLst>
+  </p:cSld>
+  <p:clrMapOvr>
+    <a:masterClrMapping/>
+  </p:clrMapOvr>
+</p:sld>
+</file>
+
+<file path=ppt/slides/slide31.xml><?xml version="1.0" encoding="utf-8"?>
+<p:sld xmlns:a="http://schemas.openxmlformats.org/drawingml/2006/main" xmlns:r="http://schemas.openxmlformats.org/officeDocument/2006/relationships" xmlns:p="http://schemas.openxmlformats.org/presentationml/2006/main">
+  <p:cSld>
+    <p:spTree>
+      <p:nvGrpSpPr>
+        <p:cNvPr id="1" name=""/>
+        <p:cNvGrpSpPr/>
+        <p:nvPr/>
+      </p:nvGrpSpPr>
+      <p:grpSpPr>
+        <a:xfrm>
+          <a:off x="0" y="0"/>
+          <a:ext cx="0" cy="0"/>
+          <a:chOff x="0" y="0"/>
+          <a:chExt cx="0" cy="0"/>
+        </a:xfrm>
+      </p:grpSpPr>
+      <p:sp>
+        <p:nvSpPr>
+          <p:cNvPr id="2" name="제목 1">
+            <a:extLst>
+              <a:ext uri="{FF2B5EF4-FFF2-40B4-BE49-F238E27FC236}">
+                <a16:creationId xmlns:a16="http://schemas.microsoft.com/office/drawing/2014/main" id="{2D7E6B8A-E1FD-472B-F033-346AC9F27163}"/>
+              </a:ext>
+            </a:extLst>
+          </p:cNvPr>
+          <p:cNvSpPr>
+            <a:spLocks noGrp="1"/>
+          </p:cNvSpPr>
+          <p:nvPr>
+            <p:ph type="title"/>
+          </p:nvPr>
+        </p:nvSpPr>
+        <p:spPr>
+          <a:xfrm>
+            <a:off x="705394" y="0"/>
+            <a:ext cx="9601200" cy="476794"/>
+          </a:xfrm>
+        </p:spPr>
+        <p:txBody>
+          <a:bodyPr>
+            <a:normAutofit/>
+          </a:bodyPr>
+          <a:lstStyle/>
+          <a:p>
+            <a:r>
+              <a:rPr lang="ko-KR" altLang="en-US" sz="2000" dirty="0"/>
+              <a:t>슬라이드 페이지 실습</a:t>
+            </a:r>
+          </a:p>
+        </p:txBody>
+      </p:sp>
+    </p:spTree>
+    <p:extLst>
+      <p:ext uri="{BB962C8B-B14F-4D97-AF65-F5344CB8AC3E}">
+        <p14:creationId xmlns:p14="http://schemas.microsoft.com/office/powerpoint/2010/main" val="1225636423"/>
+      </p:ext>
+    </p:extLst>
+  </p:cSld>
+  <p:clrMapOvr>
+    <a:masterClrMapping/>
+  </p:clrMapOvr>
+</p:sld>
+</file>
+
+<file path=ppt/slides/slide32.xml><?xml version="1.0" encoding="utf-8"?>
+<p:sld xmlns:a="http://schemas.openxmlformats.org/drawingml/2006/main" xmlns:r="http://schemas.openxmlformats.org/officeDocument/2006/relationships" xmlns:p="http://schemas.openxmlformats.org/presentationml/2006/main">
+  <p:cSld>
+    <p:spTree>
+      <p:nvGrpSpPr>
+        <p:cNvPr id="1" name=""/>
+        <p:cNvGrpSpPr/>
+        <p:nvPr/>
+      </p:nvGrpSpPr>
+      <p:grpSpPr>
+        <a:xfrm>
+          <a:off x="0" y="0"/>
+          <a:ext cx="0" cy="0"/>
+          <a:chOff x="0" y="0"/>
+          <a:chExt cx="0" cy="0"/>
+        </a:xfrm>
+      </p:grpSpPr>
+      <p:sp>
+        <p:nvSpPr>
+          <p:cNvPr id="2" name="제목 1">
+            <a:extLst>
+              <a:ext uri="{FF2B5EF4-FFF2-40B4-BE49-F238E27FC236}">
+                <a16:creationId xmlns:a16="http://schemas.microsoft.com/office/drawing/2014/main" id="{2D7E6B8A-E1FD-472B-F033-346AC9F27163}"/>
+              </a:ext>
+            </a:extLst>
+          </p:cNvPr>
+          <p:cNvSpPr>
+            <a:spLocks noGrp="1"/>
+          </p:cNvSpPr>
+          <p:nvPr>
+            <p:ph type="title"/>
+          </p:nvPr>
+        </p:nvSpPr>
+        <p:spPr>
+          <a:xfrm>
+            <a:off x="705394" y="0"/>
+            <a:ext cx="9601200" cy="476794"/>
+          </a:xfrm>
+        </p:spPr>
+        <p:txBody>
+          <a:bodyPr>
+            <a:normAutofit/>
+          </a:bodyPr>
+          <a:lstStyle/>
+          <a:p>
+            <a:r>
+              <a:rPr lang="ko-KR" altLang="en-US" sz="2000" dirty="0"/>
+              <a:t>슬라이드 페이지 실습</a:t>
+            </a:r>
+          </a:p>
+        </p:txBody>
+      </p:sp>
+    </p:spTree>
+    <p:extLst>
+      <p:ext uri="{BB962C8B-B14F-4D97-AF65-F5344CB8AC3E}">
+        <p14:creationId xmlns:p14="http://schemas.microsoft.com/office/powerpoint/2010/main" val="305204869"/>
+      </p:ext>
+    </p:extLst>
+  </p:cSld>
+  <p:clrMapOvr>
+    <a:masterClrMapping/>
+  </p:clrMapOvr>
+</p:sld>
+</file>
+
+<file path=ppt/slides/slide33.xml><?xml version="1.0" encoding="utf-8"?>
+<p:sld xmlns:a="http://schemas.openxmlformats.org/drawingml/2006/main" xmlns:r="http://schemas.openxmlformats.org/officeDocument/2006/relationships" xmlns:p="http://schemas.openxmlformats.org/presentationml/2006/main">
+  <p:cSld>
+    <p:spTree>
+      <p:nvGrpSpPr>
+        <p:cNvPr id="1" name=""/>
+        <p:cNvGrpSpPr/>
+        <p:nvPr/>
+      </p:nvGrpSpPr>
+      <p:grpSpPr>
+        <a:xfrm>
+          <a:off x="0" y="0"/>
+          <a:ext cx="0" cy="0"/>
+          <a:chOff x="0" y="0"/>
+          <a:chExt cx="0" cy="0"/>
+        </a:xfrm>
+      </p:grpSpPr>
+      <p:sp>
+        <p:nvSpPr>
+          <p:cNvPr id="2" name="제목 1">
+            <a:extLst>
+              <a:ext uri="{FF2B5EF4-FFF2-40B4-BE49-F238E27FC236}">
+                <a16:creationId xmlns:a16="http://schemas.microsoft.com/office/drawing/2014/main" id="{2D7E6B8A-E1FD-472B-F033-346AC9F27163}"/>
+              </a:ext>
+            </a:extLst>
+          </p:cNvPr>
+          <p:cNvSpPr>
+            <a:spLocks noGrp="1"/>
+          </p:cNvSpPr>
+          <p:nvPr>
+            <p:ph type="title"/>
+          </p:nvPr>
+        </p:nvSpPr>
+        <p:spPr>
+          <a:xfrm>
+            <a:off x="705394" y="0"/>
+            <a:ext cx="9601200" cy="476794"/>
+          </a:xfrm>
+        </p:spPr>
+        <p:txBody>
+          <a:bodyPr>
+            <a:normAutofit/>
+          </a:bodyPr>
+          <a:lstStyle/>
+          <a:p>
+            <a:r>
+              <a:rPr lang="ko-KR" altLang="en-US" sz="2000" dirty="0"/>
+              <a:t>슬라이드 페이지 실습</a:t>
+            </a:r>
+          </a:p>
+        </p:txBody>
+      </p:sp>
+    </p:spTree>
+    <p:extLst>
+      <p:ext uri="{BB962C8B-B14F-4D97-AF65-F5344CB8AC3E}">
+        <p14:creationId xmlns:p14="http://schemas.microsoft.com/office/powerpoint/2010/main" val="359532650"/>
+      </p:ext>
+    </p:extLst>
+  </p:cSld>
+  <p:clrMapOvr>
+    <a:masterClrMapping/>
+  </p:clrMapOvr>
+</p:sld>
+</file>
+
+<file path=ppt/slides/slide34.xml><?xml version="1.0" encoding="utf-8"?>
+<p:sld xmlns:a="http://schemas.openxmlformats.org/drawingml/2006/main" xmlns:r="http://schemas.openxmlformats.org/officeDocument/2006/relationships" xmlns:p="http://schemas.openxmlformats.org/presentationml/2006/main">
+  <p:cSld>
+    <p:spTree>
+      <p:nvGrpSpPr>
+        <p:cNvPr id="1" name=""/>
+        <p:cNvGrpSpPr/>
+        <p:nvPr/>
+      </p:nvGrpSpPr>
+      <p:grpSpPr>
+        <a:xfrm>
+          <a:off x="0" y="0"/>
+          <a:ext cx="0" cy="0"/>
+          <a:chOff x="0" y="0"/>
+          <a:chExt cx="0" cy="0"/>
+        </a:xfrm>
+      </p:grpSpPr>
+      <p:sp>
+        <p:nvSpPr>
+          <p:cNvPr id="2" name="제목 1">
+            <a:extLst>
+              <a:ext uri="{FF2B5EF4-FFF2-40B4-BE49-F238E27FC236}">
+                <a16:creationId xmlns:a16="http://schemas.microsoft.com/office/drawing/2014/main" id="{2D7E6B8A-E1FD-472B-F033-346AC9F27163}"/>
+              </a:ext>
+            </a:extLst>
+          </p:cNvPr>
+          <p:cNvSpPr>
+            <a:spLocks noGrp="1"/>
+          </p:cNvSpPr>
+          <p:nvPr>
+            <p:ph type="title"/>
+          </p:nvPr>
+        </p:nvSpPr>
+        <p:spPr>
+          <a:xfrm>
+            <a:off x="705394" y="0"/>
+            <a:ext cx="9601200" cy="476794"/>
+          </a:xfrm>
+        </p:spPr>
+        <p:txBody>
+          <a:bodyPr>
+            <a:normAutofit/>
+          </a:bodyPr>
+          <a:lstStyle/>
+          <a:p>
+            <a:r>
+              <a:rPr lang="ko-KR" altLang="en-US" sz="2000" dirty="0"/>
+              <a:t>슬라이드 페이지 실습</a:t>
+            </a:r>
+          </a:p>
+        </p:txBody>
+      </p:sp>
+    </p:spTree>
+    <p:extLst>
+      <p:ext uri="{BB962C8B-B14F-4D97-AF65-F5344CB8AC3E}">
+        <p14:creationId xmlns:p14="http://schemas.microsoft.com/office/powerpoint/2010/main" val="2138666832"/>
+      </p:ext>
+    </p:extLst>
+  </p:cSld>
+  <p:clrMapOvr>
+    <a:masterClrMapping/>
+  </p:clrMapOvr>
+</p:sld>
+</file>
+
+<file path=ppt/slides/slide35.xml><?xml version="1.0" encoding="utf-8"?>
+<p:sld xmlns:a="http://schemas.openxmlformats.org/drawingml/2006/main" xmlns:r="http://schemas.openxmlformats.org/officeDocument/2006/relationships" xmlns:p="http://schemas.openxmlformats.org/presentationml/2006/main">
+  <p:cSld>
+    <p:spTree>
+      <p:nvGrpSpPr>
+        <p:cNvPr id="1" name=""/>
+        <p:cNvGrpSpPr/>
+        <p:nvPr/>
+      </p:nvGrpSpPr>
+      <p:grpSpPr>
+        <a:xfrm>
+          <a:off x="0" y="0"/>
+          <a:ext cx="0" cy="0"/>
+          <a:chOff x="0" y="0"/>
+          <a:chExt cx="0" cy="0"/>
+        </a:xfrm>
+      </p:grpSpPr>
+      <p:sp>
+        <p:nvSpPr>
+          <p:cNvPr id="2" name="제목 1">
+            <a:extLst>
+              <a:ext uri="{FF2B5EF4-FFF2-40B4-BE49-F238E27FC236}">
+                <a16:creationId xmlns:a16="http://schemas.microsoft.com/office/drawing/2014/main" id="{2D7E6B8A-E1FD-472B-F033-346AC9F27163}"/>
+              </a:ext>
+            </a:extLst>
+          </p:cNvPr>
+          <p:cNvSpPr>
+            <a:spLocks noGrp="1"/>
+          </p:cNvSpPr>
+          <p:nvPr>
+            <p:ph type="title"/>
+          </p:nvPr>
+        </p:nvSpPr>
+        <p:spPr>
+          <a:xfrm>
+            <a:off x="705394" y="0"/>
+            <a:ext cx="9601200" cy="476794"/>
+          </a:xfrm>
+        </p:spPr>
+        <p:txBody>
+          <a:bodyPr>
+            <a:normAutofit/>
+          </a:bodyPr>
+          <a:lstStyle/>
+          <a:p>
+            <a:r>
+              <a:rPr lang="ko-KR" altLang="en-US" sz="2000" dirty="0"/>
+              <a:t>슬라이드 페이지 실습</a:t>
+            </a:r>
+          </a:p>
+        </p:txBody>
+      </p:sp>
+    </p:spTree>
+    <p:extLst>
+      <p:ext uri="{BB962C8B-B14F-4D97-AF65-F5344CB8AC3E}">
+        <p14:creationId xmlns:p14="http://schemas.microsoft.com/office/powerpoint/2010/main" val="3413029703"/>
+      </p:ext>
+    </p:extLst>
+  </p:cSld>
+  <p:clrMapOvr>
+    <a:masterClrMapping/>
+  </p:clrMapOvr>
+</p:sld>
+</file>
+
+<file path=ppt/slides/slide36.xml><?xml version="1.0" encoding="utf-8"?>
+<p:sld xmlns:a="http://schemas.openxmlformats.org/drawingml/2006/main" xmlns:r="http://schemas.openxmlformats.org/officeDocument/2006/relationships" xmlns:p="http://schemas.openxmlformats.org/presentationml/2006/main">
+  <p:cSld>
+    <p:spTree>
+      <p:nvGrpSpPr>
+        <p:cNvPr id="1" name=""/>
+        <p:cNvGrpSpPr/>
+        <p:nvPr/>
+      </p:nvGrpSpPr>
+      <p:grpSpPr>
+        <a:xfrm>
+          <a:off x="0" y="0"/>
+          <a:ext cx="0" cy="0"/>
+          <a:chOff x="0" y="0"/>
+          <a:chExt cx="0" cy="0"/>
+        </a:xfrm>
+      </p:grpSpPr>
+      <p:sp>
+        <p:nvSpPr>
+          <p:cNvPr id="2" name="제목 1">
+            <a:extLst>
+              <a:ext uri="{FF2B5EF4-FFF2-40B4-BE49-F238E27FC236}">
+                <a16:creationId xmlns:a16="http://schemas.microsoft.com/office/drawing/2014/main" id="{2D7E6B8A-E1FD-472B-F033-346AC9F27163}"/>
+              </a:ext>
+            </a:extLst>
+          </p:cNvPr>
+          <p:cNvSpPr>
+            <a:spLocks noGrp="1"/>
+          </p:cNvSpPr>
+          <p:nvPr>
+            <p:ph type="title"/>
+          </p:nvPr>
+        </p:nvSpPr>
+        <p:spPr>
+          <a:xfrm>
+            <a:off x="705394" y="0"/>
+            <a:ext cx="9601200" cy="476794"/>
+          </a:xfrm>
+        </p:spPr>
+        <p:txBody>
+          <a:bodyPr>
+            <a:normAutofit/>
+          </a:bodyPr>
+          <a:lstStyle/>
+          <a:p>
+            <a:r>
+              <a:rPr lang="ko-KR" altLang="en-US" sz="2000" dirty="0"/>
+              <a:t>슬라이드 페이지 실습</a:t>
+            </a:r>
+          </a:p>
+        </p:txBody>
+      </p:sp>
+    </p:spTree>
+    <p:extLst>
+      <p:ext uri="{BB962C8B-B14F-4D97-AF65-F5344CB8AC3E}">
+        <p14:creationId xmlns:p14="http://schemas.microsoft.com/office/powerpoint/2010/main" val="1527281261"/>
+      </p:ext>
+    </p:extLst>
+  </p:cSld>
+  <p:clrMapOvr>
+    <a:masterClrMapping/>
+  </p:clrMapOvr>
+</p:sld>
+</file>
+
+<file path=ppt/slides/slide37.xml><?xml version="1.0" encoding="utf-8"?>
+<p:sld xmlns:a="http://schemas.openxmlformats.org/drawingml/2006/main" xmlns:r="http://schemas.openxmlformats.org/officeDocument/2006/relationships" xmlns:p="http://schemas.openxmlformats.org/presentationml/2006/main">
+  <p:cSld>
+    <p:spTree>
+      <p:nvGrpSpPr>
+        <p:cNvPr id="1" name=""/>
+        <p:cNvGrpSpPr/>
+        <p:nvPr/>
+      </p:nvGrpSpPr>
+      <p:grpSpPr>
+        <a:xfrm>
+          <a:off x="0" y="0"/>
+          <a:ext cx="0" cy="0"/>
+          <a:chOff x="0" y="0"/>
+          <a:chExt cx="0" cy="0"/>
+        </a:xfrm>
+      </p:grpSpPr>
+      <p:sp>
+        <p:nvSpPr>
+          <p:cNvPr id="2" name="제목 1">
+            <a:extLst>
+              <a:ext uri="{FF2B5EF4-FFF2-40B4-BE49-F238E27FC236}">
+                <a16:creationId xmlns:a16="http://schemas.microsoft.com/office/drawing/2014/main" id="{2D7E6B8A-E1FD-472B-F033-346AC9F27163}"/>
+              </a:ext>
+            </a:extLst>
+          </p:cNvPr>
+          <p:cNvSpPr>
+            <a:spLocks noGrp="1"/>
+          </p:cNvSpPr>
+          <p:nvPr>
+            <p:ph type="title"/>
+          </p:nvPr>
+        </p:nvSpPr>
+        <p:spPr>
+          <a:xfrm>
+            <a:off x="705394" y="0"/>
+            <a:ext cx="9601200" cy="476794"/>
+          </a:xfrm>
+        </p:spPr>
+        <p:txBody>
+          <a:bodyPr>
+            <a:normAutofit/>
+          </a:bodyPr>
+          <a:lstStyle/>
+          <a:p>
+            <a:r>
+              <a:rPr lang="ko-KR" altLang="en-US" sz="2000" dirty="0"/>
+              <a:t>슬라이드 페이지 실습</a:t>
+            </a:r>
+          </a:p>
+        </p:txBody>
+      </p:sp>
+    </p:spTree>
+    <p:extLst>
+      <p:ext uri="{BB962C8B-B14F-4D97-AF65-F5344CB8AC3E}">
+        <p14:creationId xmlns:p14="http://schemas.microsoft.com/office/powerpoint/2010/main" val="1496078086"/>
       </p:ext>
     </p:extLst>
   </p:cSld>
@@ -4918,36 +7383,6 @@
       </p:sp>
       <p:pic>
         <p:nvPicPr>
-          <p:cNvPr id="4" name="그림 3">
-            <a:extLst>
-              <a:ext uri="{FF2B5EF4-FFF2-40B4-BE49-F238E27FC236}">
-                <a16:creationId xmlns:a16="http://schemas.microsoft.com/office/drawing/2014/main" id="{CB94C84A-702B-6135-7D28-B4F0E364100B}"/>
-              </a:ext>
-            </a:extLst>
-          </p:cNvPr>
-          <p:cNvPicPr>
-            <a:picLocks noChangeAspect="1"/>
-          </p:cNvPicPr>
-          <p:nvPr/>
-        </p:nvPicPr>
-        <p:blipFill>
-          <a:blip r:embed="rId2"/>
-          <a:stretch>
-            <a:fillRect/>
-          </a:stretch>
-        </p:blipFill>
-        <p:spPr>
-          <a:xfrm>
-            <a:off x="2299757" y="1475434"/>
-            <a:ext cx="7592485" cy="1790950"/>
-          </a:xfrm>
-          <a:prstGeom prst="rect">
-            <a:avLst/>
-          </a:prstGeom>
-        </p:spPr>
-      </p:pic>
-      <p:pic>
-        <p:nvPicPr>
           <p:cNvPr id="6" name="그림 5">
             <a:extLst>
               <a:ext uri="{FF2B5EF4-FFF2-40B4-BE49-F238E27FC236}">
@@ -4961,7 +7396,7 @@
           <p:nvPr/>
         </p:nvPicPr>
         <p:blipFill>
-          <a:blip r:embed="rId3"/>
+          <a:blip r:embed="rId2"/>
           <a:stretch>
             <a:fillRect/>
           </a:stretch>
@@ -4991,7 +7426,7 @@
           <p:nvPr/>
         </p:nvPicPr>
         <p:blipFill>
-          <a:blip r:embed="rId4"/>
+          <a:blip r:embed="rId3"/>
           <a:stretch>
             <a:fillRect/>
           </a:stretch>
@@ -5041,6 +7476,36 @@
           </a:p>
         </p:txBody>
       </p:sp>
+      <p:pic>
+        <p:nvPicPr>
+          <p:cNvPr id="11" name="그림 10">
+            <a:extLst>
+              <a:ext uri="{FF2B5EF4-FFF2-40B4-BE49-F238E27FC236}">
+                <a16:creationId xmlns:a16="http://schemas.microsoft.com/office/drawing/2014/main" id="{199DFE2F-601D-032F-3B3D-4E33CF7D0F46}"/>
+              </a:ext>
+            </a:extLst>
+          </p:cNvPr>
+          <p:cNvPicPr>
+            <a:picLocks noChangeAspect="1"/>
+          </p:cNvPicPr>
+          <p:nvPr/>
+        </p:nvPicPr>
+        <p:blipFill>
+          <a:blip r:embed="rId4"/>
+          <a:stretch>
+            <a:fillRect/>
+          </a:stretch>
+        </p:blipFill>
+        <p:spPr>
+          <a:xfrm>
+            <a:off x="2133046" y="1265855"/>
+            <a:ext cx="7925906" cy="1819529"/>
+          </a:xfrm>
+          <a:prstGeom prst="rect">
+            <a:avLst/>
+          </a:prstGeom>
+        </p:spPr>
+      </p:pic>
     </p:spTree>
     <p:extLst>
       <p:ext uri="{BB962C8B-B14F-4D97-AF65-F5344CB8AC3E}">
@@ -5116,36 +7581,6 @@
       </p:sp>
       <p:pic>
         <p:nvPicPr>
-          <p:cNvPr id="4" name="그림 3">
-            <a:extLst>
-              <a:ext uri="{FF2B5EF4-FFF2-40B4-BE49-F238E27FC236}">
-                <a16:creationId xmlns:a16="http://schemas.microsoft.com/office/drawing/2014/main" id="{9BC26495-8A9B-F421-A13C-ED6FC471B6F1}"/>
-              </a:ext>
-            </a:extLst>
-          </p:cNvPr>
-          <p:cNvPicPr>
-            <a:picLocks noChangeAspect="1"/>
-          </p:cNvPicPr>
-          <p:nvPr/>
-        </p:nvPicPr>
-        <p:blipFill>
-          <a:blip r:embed="rId2"/>
-          <a:stretch>
-            <a:fillRect/>
-          </a:stretch>
-        </p:blipFill>
-        <p:spPr>
-          <a:xfrm>
-            <a:off x="2166389" y="899234"/>
-            <a:ext cx="7859222" cy="2838846"/>
-          </a:xfrm>
-          <a:prstGeom prst="rect">
-            <a:avLst/>
-          </a:prstGeom>
-        </p:spPr>
-      </p:pic>
-      <p:pic>
-        <p:nvPicPr>
           <p:cNvPr id="6" name="그림 5">
             <a:extLst>
               <a:ext uri="{FF2B5EF4-FFF2-40B4-BE49-F238E27FC236}">
@@ -5159,7 +7594,7 @@
           <p:nvPr/>
         </p:nvPicPr>
         <p:blipFill>
-          <a:blip r:embed="rId3"/>
+          <a:blip r:embed="rId2"/>
           <a:stretch>
             <a:fillRect/>
           </a:stretch>
@@ -5189,6 +7624,36 @@
           <p:nvPr/>
         </p:nvPicPr>
         <p:blipFill>
+          <a:blip r:embed="rId3"/>
+          <a:stretch>
+            <a:fillRect/>
+          </a:stretch>
+        </p:blipFill>
+        <p:spPr>
+          <a:xfrm>
+            <a:off x="4933787" y="4830645"/>
+            <a:ext cx="2324424" cy="1562318"/>
+          </a:xfrm>
+          <a:prstGeom prst="rect">
+            <a:avLst/>
+          </a:prstGeom>
+        </p:spPr>
+      </p:pic>
+      <p:pic>
+        <p:nvPicPr>
+          <p:cNvPr id="10" name="그림 9">
+            <a:extLst>
+              <a:ext uri="{FF2B5EF4-FFF2-40B4-BE49-F238E27FC236}">
+                <a16:creationId xmlns:a16="http://schemas.microsoft.com/office/drawing/2014/main" id="{B5CB4F5A-AED6-B0AB-2B6B-A2E8126E57A8}"/>
+              </a:ext>
+            </a:extLst>
+          </p:cNvPr>
+          <p:cNvPicPr>
+            <a:picLocks noChangeAspect="1"/>
+          </p:cNvPicPr>
+          <p:nvPr/>
+        </p:nvPicPr>
+        <p:blipFill>
           <a:blip r:embed="rId4"/>
           <a:stretch>
             <a:fillRect/>
@@ -5196,8 +7661,8 @@
         </p:blipFill>
         <p:spPr>
           <a:xfrm>
-            <a:off x="4933787" y="4830645"/>
-            <a:ext cx="2324424" cy="1562318"/>
+            <a:off x="2028256" y="899234"/>
+            <a:ext cx="8135485" cy="2791215"/>
           </a:xfrm>
           <a:prstGeom prst="rect">
             <a:avLst/>
@@ -5279,10 +7744,10 @@
       </p:sp>
       <p:pic>
         <p:nvPicPr>
-          <p:cNvPr id="4" name="그림 3">
+          <p:cNvPr id="6" name="그림 5">
             <a:extLst>
               <a:ext uri="{FF2B5EF4-FFF2-40B4-BE49-F238E27FC236}">
-                <a16:creationId xmlns:a16="http://schemas.microsoft.com/office/drawing/2014/main" id="{5C952E0E-AED4-55E3-85F8-15CCE97C757E}"/>
+                <a16:creationId xmlns:a16="http://schemas.microsoft.com/office/drawing/2014/main" id="{2A48F757-87D6-76D7-09DC-CF55D3F5082E}"/>
               </a:ext>
             </a:extLst>
           </p:cNvPr>
@@ -5299,8 +7764,8 @@
         </p:blipFill>
         <p:spPr>
           <a:xfrm>
-            <a:off x="2299757" y="1010809"/>
-            <a:ext cx="7592485" cy="2876951"/>
+            <a:off x="5029358" y="4421775"/>
+            <a:ext cx="2133283" cy="1643883"/>
           </a:xfrm>
           <a:prstGeom prst="rect">
             <a:avLst/>
@@ -5309,10 +7774,10 @@
       </p:pic>
       <p:pic>
         <p:nvPicPr>
-          <p:cNvPr id="6" name="그림 5">
+          <p:cNvPr id="8" name="그림 7">
             <a:extLst>
               <a:ext uri="{FF2B5EF4-FFF2-40B4-BE49-F238E27FC236}">
-                <a16:creationId xmlns:a16="http://schemas.microsoft.com/office/drawing/2014/main" id="{2A48F757-87D6-76D7-09DC-CF55D3F5082E}"/>
+                <a16:creationId xmlns:a16="http://schemas.microsoft.com/office/drawing/2014/main" id="{334EF974-5A01-D482-8205-8E55FFFE0B18}"/>
               </a:ext>
             </a:extLst>
           </p:cNvPr>
@@ -5329,8 +7794,8 @@
         </p:blipFill>
         <p:spPr>
           <a:xfrm>
-            <a:off x="5029358" y="4421775"/>
-            <a:ext cx="2133283" cy="1643883"/>
+            <a:off x="2152098" y="1025098"/>
+            <a:ext cx="7887801" cy="2848373"/>
           </a:xfrm>
           <a:prstGeom prst="rect">
             <a:avLst/>
@@ -5400,20 +7865,154 @@
               <a:t>슬라이드 </a:t>
             </a:r>
             <a:r>
-              <a:rPr lang="en-US" altLang="ko-KR" sz="2000"/>
+              <a:rPr lang="en-US" altLang="ko-KR" sz="2000" dirty="0"/>
               <a:t>22</a:t>
             </a:r>
             <a:r>
-              <a:rPr lang="ko-KR" altLang="en-US" sz="2000"/>
-              <a:t>페이지 </a:t>
-            </a:r>
-            <a:r>
               <a:rPr lang="ko-KR" altLang="en-US" sz="2000" dirty="0"/>
-              <a:t>실습</a:t>
-            </a:r>
-          </a:p>
-        </p:txBody>
-      </p:sp>
+              <a:t>페이지 실습</a:t>
+            </a:r>
+            <a:r>
+              <a:rPr lang="en-US" altLang="ko-KR" sz="2000" dirty="0"/>
+              <a:t> (1)</a:t>
+            </a:r>
+            <a:endParaRPr lang="ko-KR" altLang="en-US" sz="2000" dirty="0"/>
+          </a:p>
+        </p:txBody>
+      </p:sp>
+      <p:pic>
+        <p:nvPicPr>
+          <p:cNvPr id="6" name="그림 5">
+            <a:extLst>
+              <a:ext uri="{FF2B5EF4-FFF2-40B4-BE49-F238E27FC236}">
+                <a16:creationId xmlns:a16="http://schemas.microsoft.com/office/drawing/2014/main" id="{DD0F4908-168C-C4B5-38C8-0F5BAA99893E}"/>
+              </a:ext>
+            </a:extLst>
+          </p:cNvPr>
+          <p:cNvPicPr>
+            <a:picLocks noChangeAspect="1"/>
+          </p:cNvPicPr>
+          <p:nvPr/>
+        </p:nvPicPr>
+        <p:blipFill>
+          <a:blip r:embed="rId2"/>
+          <a:stretch>
+            <a:fillRect/>
+          </a:stretch>
+        </p:blipFill>
+        <p:spPr>
+          <a:xfrm>
+            <a:off x="9238560" y="1152876"/>
+            <a:ext cx="1813849" cy="1195172"/>
+          </a:xfrm>
+          <a:prstGeom prst="rect">
+            <a:avLst/>
+          </a:prstGeom>
+        </p:spPr>
+      </p:pic>
+      <p:sp>
+        <p:nvSpPr>
+          <p:cNvPr id="7" name="TextBox 6">
+            <a:extLst>
+              <a:ext uri="{FF2B5EF4-FFF2-40B4-BE49-F238E27FC236}">
+                <a16:creationId xmlns:a16="http://schemas.microsoft.com/office/drawing/2014/main" id="{8A7433FC-343C-8EB6-BE8D-42A826305148}"/>
+              </a:ext>
+            </a:extLst>
+          </p:cNvPr>
+          <p:cNvSpPr txBox="1"/>
+          <p:nvPr/>
+        </p:nvSpPr>
+        <p:spPr>
+          <a:xfrm>
+            <a:off x="8934994" y="2523073"/>
+            <a:ext cx="2743200" cy="369332"/>
+          </a:xfrm>
+          <a:prstGeom prst="rect">
+            <a:avLst/>
+          </a:prstGeom>
+          <a:noFill/>
+        </p:spPr>
+        <p:txBody>
+          <a:bodyPr wrap="square" rtlCol="0">
+            <a:spAutoFit/>
+          </a:bodyPr>
+          <a:lstStyle/>
+          <a:p>
+            <a:r>
+              <a:rPr lang="en-US" altLang="ko-KR" dirty="0" err="1"/>
+              <a:t>Freewifi</a:t>
+            </a:r>
+            <a:r>
+              <a:rPr lang="en-US" altLang="ko-KR" dirty="0"/>
+              <a:t> </a:t>
+            </a:r>
+            <a:r>
+              <a:rPr lang="ko-KR" altLang="en-US" dirty="0"/>
+              <a:t>테이블 생성됨</a:t>
+            </a:r>
+          </a:p>
+        </p:txBody>
+      </p:sp>
+      <p:pic>
+        <p:nvPicPr>
+          <p:cNvPr id="11" name="그림 10">
+            <a:extLst>
+              <a:ext uri="{FF2B5EF4-FFF2-40B4-BE49-F238E27FC236}">
+                <a16:creationId xmlns:a16="http://schemas.microsoft.com/office/drawing/2014/main" id="{A0274454-584A-16B9-20D0-B7F95C3411BE}"/>
+              </a:ext>
+            </a:extLst>
+          </p:cNvPr>
+          <p:cNvPicPr>
+            <a:picLocks noChangeAspect="1"/>
+          </p:cNvPicPr>
+          <p:nvPr/>
+        </p:nvPicPr>
+        <p:blipFill>
+          <a:blip r:embed="rId3"/>
+          <a:stretch>
+            <a:fillRect/>
+          </a:stretch>
+        </p:blipFill>
+        <p:spPr>
+          <a:xfrm>
+            <a:off x="0" y="332017"/>
+            <a:ext cx="7868748" cy="4382112"/>
+          </a:xfrm>
+          <a:prstGeom prst="rect">
+            <a:avLst/>
+          </a:prstGeom>
+        </p:spPr>
+      </p:pic>
+      <p:pic>
+        <p:nvPicPr>
+          <p:cNvPr id="13" name="그림 12">
+            <a:extLst>
+              <a:ext uri="{FF2B5EF4-FFF2-40B4-BE49-F238E27FC236}">
+                <a16:creationId xmlns:a16="http://schemas.microsoft.com/office/drawing/2014/main" id="{FA9336D5-FC5F-F397-889F-29DDE8EDE972}"/>
+              </a:ext>
+            </a:extLst>
+          </p:cNvPr>
+          <p:cNvPicPr>
+            <a:picLocks noChangeAspect="1"/>
+          </p:cNvPicPr>
+          <p:nvPr/>
+        </p:nvPicPr>
+        <p:blipFill>
+          <a:blip r:embed="rId4"/>
+          <a:stretch>
+            <a:fillRect/>
+          </a:stretch>
+        </p:blipFill>
+        <p:spPr>
+          <a:xfrm>
+            <a:off x="0" y="4886050"/>
+            <a:ext cx="7868748" cy="1971950"/>
+          </a:xfrm>
+          <a:prstGeom prst="rect">
+            <a:avLst/>
+          </a:prstGeom>
+        </p:spPr>
+      </p:pic>
     </p:spTree>
     <p:extLst>
       <p:ext uri="{BB962C8B-B14F-4D97-AF65-F5344CB8AC3E}">
@@ -5474,11 +8073,444 @@
           <a:p>
             <a:r>
               <a:rPr lang="ko-KR" altLang="en-US" sz="2000" dirty="0"/>
-              <a:t>슬라이드 페이지 실습</a:t>
-            </a:r>
-          </a:p>
-        </p:txBody>
-      </p:sp>
+              <a:t>슬라이드 </a:t>
+            </a:r>
+            <a:r>
+              <a:rPr lang="en-US" altLang="ko-KR" sz="2000" dirty="0"/>
+              <a:t>22</a:t>
+            </a:r>
+            <a:r>
+              <a:rPr lang="ko-KR" altLang="en-US" sz="2000" dirty="0"/>
+              <a:t>페이지 실습</a:t>
+            </a:r>
+            <a:r>
+              <a:rPr lang="en-US" altLang="ko-KR" sz="2000" dirty="0"/>
+              <a:t> (2)</a:t>
+            </a:r>
+            <a:endParaRPr lang="ko-KR" altLang="en-US" sz="2000" dirty="0"/>
+          </a:p>
+        </p:txBody>
+      </p:sp>
+      <p:sp>
+        <p:nvSpPr>
+          <p:cNvPr id="3" name="TextBox 2">
+            <a:extLst>
+              <a:ext uri="{FF2B5EF4-FFF2-40B4-BE49-F238E27FC236}">
+                <a16:creationId xmlns:a16="http://schemas.microsoft.com/office/drawing/2014/main" id="{C7F8981A-F8AF-1B6F-A445-BF2CC1BA7FC2}"/>
+              </a:ext>
+            </a:extLst>
+          </p:cNvPr>
+          <p:cNvSpPr txBox="1"/>
+          <p:nvPr/>
+        </p:nvSpPr>
+        <p:spPr>
+          <a:xfrm>
+            <a:off x="1280159" y="992673"/>
+            <a:ext cx="10554789" cy="3970318"/>
+          </a:xfrm>
+          <a:prstGeom prst="rect">
+            <a:avLst/>
+          </a:prstGeom>
+          <a:noFill/>
+        </p:spPr>
+        <p:txBody>
+          <a:bodyPr wrap="square" rtlCol="0">
+            <a:spAutoFit/>
+          </a:bodyPr>
+          <a:lstStyle/>
+          <a:p>
+            <a:r>
+              <a:rPr lang="ko-KR" altLang="en-US" dirty="0"/>
+              <a:t>슬라이드 </a:t>
+            </a:r>
+            <a:r>
+              <a:rPr lang="en-US" altLang="ko-KR" dirty="0"/>
+              <a:t>23 </a:t>
+            </a:r>
+            <a:r>
+              <a:rPr lang="en-US" altLang="ko-KR" dirty="0" err="1"/>
+              <a:t>freewifi</a:t>
+            </a:r>
+            <a:r>
+              <a:rPr lang="en-US" altLang="ko-KR" dirty="0"/>
+              <a:t>(2) - </a:t>
+            </a:r>
+            <a:r>
+              <a:rPr lang="ko-KR" altLang="en-US" dirty="0"/>
+              <a:t>실습 </a:t>
+            </a:r>
+            <a:r>
+              <a:rPr lang="en-US" altLang="ko-KR" dirty="0"/>
+              <a:t>2 </a:t>
+            </a:r>
+            <a:r>
+              <a:rPr lang="ko-KR" altLang="en-US" dirty="0"/>
+              <a:t>에러</a:t>
+            </a:r>
+          </a:p>
+          <a:p>
+            <a:r>
+              <a:rPr lang="en-US" altLang="ko-KR" dirty="0"/>
+              <a:t>-&gt; A,B,K varchar(150)</a:t>
+            </a:r>
+            <a:r>
+              <a:rPr lang="ko-KR" altLang="en-US" dirty="0"/>
+              <a:t>으로 늘려주기</a:t>
+            </a:r>
+          </a:p>
+          <a:p>
+            <a:r>
+              <a:rPr lang="en-US" altLang="ko-KR" dirty="0"/>
+              <a:t>-&gt; A: </a:t>
+            </a:r>
+            <a:r>
+              <a:rPr lang="ko-KR" altLang="en-US" dirty="0"/>
+              <a:t>설치장소명 </a:t>
+            </a:r>
+            <a:r>
+              <a:rPr lang="en-US" altLang="ko-KR" dirty="0" err="1"/>
+              <a:t>inst_place</a:t>
+            </a:r>
+            <a:endParaRPr lang="en-US" altLang="ko-KR" dirty="0"/>
+          </a:p>
+          <a:p>
+            <a:r>
+              <a:rPr lang="en-US" altLang="ko-KR" dirty="0"/>
+              <a:t>-&gt; B: </a:t>
+            </a:r>
+            <a:r>
+              <a:rPr lang="ko-KR" altLang="en-US" dirty="0" err="1"/>
+              <a:t>설치장소상세</a:t>
+            </a:r>
+            <a:r>
+              <a:rPr lang="ko-KR" altLang="en-US" dirty="0"/>
+              <a:t> </a:t>
+            </a:r>
+            <a:r>
+              <a:rPr lang="en-US" altLang="ko-KR" dirty="0" err="1"/>
+              <a:t>inst_place_detail</a:t>
+            </a:r>
+            <a:endParaRPr lang="en-US" altLang="ko-KR" dirty="0"/>
+          </a:p>
+          <a:p>
+            <a:r>
+              <a:rPr lang="en-US" altLang="ko-KR" dirty="0"/>
+              <a:t>-&gt; K : </a:t>
+            </a:r>
+            <a:r>
+              <a:rPr lang="ko-KR" altLang="en-US" dirty="0"/>
+              <a:t>관리기관명 </a:t>
+            </a:r>
+            <a:r>
+              <a:rPr lang="en-US" altLang="ko-KR" dirty="0" err="1"/>
+              <a:t>manage_office</a:t>
+            </a:r>
+            <a:endParaRPr lang="en-US" altLang="ko-KR" dirty="0"/>
+          </a:p>
+          <a:p>
+            <a:r>
+              <a:rPr lang="en-US" altLang="ko-KR" dirty="0"/>
+              <a:t>-&gt; alter table </a:t>
+            </a:r>
+            <a:r>
+              <a:rPr lang="ko-KR" altLang="en-US" dirty="0"/>
+              <a:t>테이블명 </a:t>
+            </a:r>
+            <a:r>
+              <a:rPr lang="en-US" altLang="ko-KR" dirty="0"/>
+              <a:t>modify </a:t>
+            </a:r>
+            <a:r>
+              <a:rPr lang="ko-KR" altLang="en-US" dirty="0" err="1"/>
+              <a:t>컬렴명</a:t>
+            </a:r>
+            <a:r>
+              <a:rPr lang="ko-KR" altLang="en-US" dirty="0"/>
+              <a:t> </a:t>
+            </a:r>
+            <a:r>
+              <a:rPr lang="en-US" altLang="ko-KR" dirty="0"/>
+              <a:t>varchar(</a:t>
+            </a:r>
+            <a:r>
+              <a:rPr lang="ko-KR" altLang="en-US" dirty="0"/>
+              <a:t>사이즈</a:t>
+            </a:r>
+            <a:r>
+              <a:rPr lang="en-US" altLang="ko-KR" dirty="0"/>
+              <a:t>); </a:t>
+            </a:r>
+            <a:r>
+              <a:rPr lang="ko-KR" altLang="en-US" dirty="0"/>
+              <a:t>활용</a:t>
+            </a:r>
+          </a:p>
+          <a:p>
+            <a:endParaRPr lang="ko-KR" altLang="en-US" dirty="0"/>
+          </a:p>
+          <a:p>
+            <a:r>
+              <a:rPr lang="ko-KR" altLang="en-US" dirty="0"/>
+              <a:t>슬라이드 </a:t>
+            </a:r>
+            <a:r>
+              <a:rPr lang="en-US" altLang="ko-KR" dirty="0"/>
+              <a:t>23 </a:t>
+            </a:r>
+            <a:r>
+              <a:rPr lang="en-US" altLang="ko-KR" dirty="0" err="1"/>
+              <a:t>freewifi</a:t>
+            </a:r>
+            <a:r>
+              <a:rPr lang="en-US" altLang="ko-KR" dirty="0"/>
+              <a:t>(2) - </a:t>
+            </a:r>
+            <a:r>
+              <a:rPr lang="ko-KR" altLang="en-US" dirty="0"/>
+              <a:t>실습 </a:t>
+            </a:r>
+            <a:r>
+              <a:rPr lang="en-US" altLang="ko-KR" dirty="0"/>
+              <a:t>2 </a:t>
+            </a:r>
+            <a:r>
+              <a:rPr lang="ko-KR" altLang="en-US" dirty="0"/>
+              <a:t>에러 </a:t>
+            </a:r>
+            <a:r>
+              <a:rPr lang="en-US" altLang="ko-KR" dirty="0"/>
+              <a:t>(2)</a:t>
+            </a:r>
+          </a:p>
+          <a:p>
+            <a:r>
+              <a:rPr lang="en-US" altLang="ko-KR" dirty="0"/>
+              <a:t>-&gt; Data too long for column '</a:t>
+            </a:r>
+            <a:r>
+              <a:rPr lang="en-US" altLang="ko-KR" dirty="0" err="1"/>
+              <a:t>inst_place_detail</a:t>
+            </a:r>
+            <a:r>
+              <a:rPr lang="en-US" altLang="ko-KR" dirty="0"/>
+              <a:t>'</a:t>
+            </a:r>
+          </a:p>
+          <a:p>
+            <a:r>
+              <a:rPr lang="en-US" altLang="ko-KR" dirty="0"/>
+              <a:t>-&gt; </a:t>
+            </a:r>
+            <a:r>
+              <a:rPr lang="en-US" altLang="ko-KR" dirty="0" err="1"/>
+              <a:t>inst_place_detail</a:t>
+            </a:r>
+            <a:r>
+              <a:rPr lang="en-US" altLang="ko-KR" dirty="0"/>
+              <a:t> varchar()</a:t>
+            </a:r>
+            <a:r>
+              <a:rPr lang="ko-KR" altLang="en-US" dirty="0"/>
+              <a:t>사이즈를 </a:t>
+            </a:r>
+            <a:r>
+              <a:rPr lang="en-US" altLang="ko-KR" dirty="0"/>
+              <a:t>250</a:t>
+            </a:r>
+            <a:r>
+              <a:rPr lang="ko-KR" altLang="en-US" dirty="0"/>
+              <a:t>으로 다시 변경</a:t>
+            </a:r>
+          </a:p>
+          <a:p>
+            <a:endParaRPr lang="ko-KR" altLang="en-US" dirty="0"/>
+          </a:p>
+          <a:p>
+            <a:r>
+              <a:rPr lang="ko-KR" altLang="en-US" dirty="0"/>
+              <a:t>슬라이드 </a:t>
+            </a:r>
+            <a:r>
+              <a:rPr lang="en-US" altLang="ko-KR" dirty="0"/>
+              <a:t>23 </a:t>
+            </a:r>
+            <a:r>
+              <a:rPr lang="en-US" altLang="ko-KR" dirty="0" err="1"/>
+              <a:t>freewifi</a:t>
+            </a:r>
+            <a:r>
+              <a:rPr lang="en-US" altLang="ko-KR" dirty="0"/>
+              <a:t>(2) - </a:t>
+            </a:r>
+            <a:r>
+              <a:rPr lang="ko-KR" altLang="en-US" dirty="0"/>
+              <a:t>실습 </a:t>
+            </a:r>
+            <a:r>
+              <a:rPr lang="en-US" altLang="ko-KR" dirty="0"/>
+              <a:t>2 </a:t>
+            </a:r>
+            <a:r>
+              <a:rPr lang="ko-KR" altLang="en-US" dirty="0"/>
+              <a:t>에러 </a:t>
+            </a:r>
+            <a:r>
+              <a:rPr lang="en-US" altLang="ko-KR" dirty="0"/>
+              <a:t>(3)</a:t>
+            </a:r>
+          </a:p>
+          <a:p>
+            <a:r>
+              <a:rPr lang="en-US" altLang="ko-KR" dirty="0"/>
+              <a:t>-&gt; 12271</a:t>
+            </a:r>
+            <a:r>
+              <a:rPr lang="ko-KR" altLang="en-US" dirty="0"/>
+              <a:t>번째 항목 </a:t>
+            </a:r>
+            <a:r>
+              <a:rPr lang="en-US" altLang="ko-KR" dirty="0" err="1"/>
+              <a:t>wifi_ssid</a:t>
+            </a:r>
+            <a:r>
+              <a:rPr lang="en-US" altLang="ko-KR" dirty="0"/>
+              <a:t> column Data too long for column '</a:t>
+            </a:r>
+            <a:r>
+              <a:rPr lang="en-US" altLang="ko-KR" dirty="0" err="1"/>
+              <a:t>inst_place_detail</a:t>
+            </a:r>
+            <a:r>
+              <a:rPr lang="en-US" altLang="ko-KR" dirty="0"/>
+              <a:t>' </a:t>
+            </a:r>
+            <a:r>
+              <a:rPr lang="ko-KR" altLang="en-US" dirty="0"/>
+              <a:t>에러</a:t>
+            </a:r>
+          </a:p>
+          <a:p>
+            <a:r>
+              <a:rPr lang="en-US" altLang="ko-KR" dirty="0"/>
+              <a:t>-&gt; </a:t>
+            </a:r>
+            <a:r>
+              <a:rPr lang="en-US" altLang="ko-KR" dirty="0" err="1"/>
+              <a:t>wifi_ssid</a:t>
+            </a:r>
+            <a:r>
+              <a:rPr lang="ko-KR" altLang="en-US" dirty="0"/>
+              <a:t>의 </a:t>
+            </a:r>
+            <a:r>
+              <a:rPr lang="en-US" altLang="ko-KR" dirty="0"/>
+              <a:t>varchar( )</a:t>
+            </a:r>
+            <a:r>
+              <a:rPr lang="ko-KR" altLang="en-US" dirty="0"/>
+              <a:t>사이즈 </a:t>
+            </a:r>
+            <a:r>
+              <a:rPr lang="en-US" altLang="ko-KR" dirty="0"/>
+              <a:t>150</a:t>
+            </a:r>
+            <a:r>
+              <a:rPr lang="ko-KR" altLang="en-US" dirty="0"/>
+              <a:t>으로 변경</a:t>
+            </a:r>
+          </a:p>
+        </p:txBody>
+      </p:sp>
+      <p:pic>
+        <p:nvPicPr>
+          <p:cNvPr id="5" name="그림 4">
+            <a:extLst>
+              <a:ext uri="{FF2B5EF4-FFF2-40B4-BE49-F238E27FC236}">
+                <a16:creationId xmlns:a16="http://schemas.microsoft.com/office/drawing/2014/main" id="{9D666702-6621-505A-7C26-D682CBFEECC4}"/>
+              </a:ext>
+            </a:extLst>
+          </p:cNvPr>
+          <p:cNvPicPr>
+            <a:picLocks noChangeAspect="1"/>
+          </p:cNvPicPr>
+          <p:nvPr/>
+        </p:nvPicPr>
+        <p:blipFill>
+          <a:blip r:embed="rId2"/>
+          <a:stretch>
+            <a:fillRect/>
+          </a:stretch>
+        </p:blipFill>
+        <p:spPr>
+          <a:xfrm>
+            <a:off x="6866755" y="1191040"/>
+            <a:ext cx="5220429" cy="971686"/>
+          </a:xfrm>
+          <a:prstGeom prst="rect">
+            <a:avLst/>
+          </a:prstGeom>
+        </p:spPr>
+      </p:pic>
+      <p:pic>
+        <p:nvPicPr>
+          <p:cNvPr id="7" name="그림 6">
+            <a:extLst>
+              <a:ext uri="{FF2B5EF4-FFF2-40B4-BE49-F238E27FC236}">
+                <a16:creationId xmlns:a16="http://schemas.microsoft.com/office/drawing/2014/main" id="{07F735B6-F7DB-DEB4-1840-467146D5D55C}"/>
+              </a:ext>
+            </a:extLst>
+          </p:cNvPr>
+          <p:cNvPicPr>
+            <a:picLocks noChangeAspect="1"/>
+          </p:cNvPicPr>
+          <p:nvPr/>
+        </p:nvPicPr>
+        <p:blipFill>
+          <a:blip r:embed="rId3"/>
+          <a:stretch>
+            <a:fillRect/>
+          </a:stretch>
+        </p:blipFill>
+        <p:spPr>
+          <a:xfrm>
+            <a:off x="6890572" y="3162263"/>
+            <a:ext cx="5172797" cy="266737"/>
+          </a:xfrm>
+          <a:prstGeom prst="rect">
+            <a:avLst/>
+          </a:prstGeom>
+        </p:spPr>
+      </p:pic>
+      <p:pic>
+        <p:nvPicPr>
+          <p:cNvPr id="9" name="그림 8">
+            <a:extLst>
+              <a:ext uri="{FF2B5EF4-FFF2-40B4-BE49-F238E27FC236}">
+                <a16:creationId xmlns:a16="http://schemas.microsoft.com/office/drawing/2014/main" id="{E8C4A4BC-76B8-8CEC-B46A-9E1B03C44804}"/>
+              </a:ext>
+            </a:extLst>
+          </p:cNvPr>
+          <p:cNvPicPr>
+            <a:picLocks noChangeAspect="1"/>
+          </p:cNvPicPr>
+          <p:nvPr/>
+        </p:nvPicPr>
+        <p:blipFill>
+          <a:blip r:embed="rId4"/>
+          <a:stretch>
+            <a:fillRect/>
+          </a:stretch>
+        </p:blipFill>
+        <p:spPr>
+          <a:xfrm>
+            <a:off x="7209702" y="4923906"/>
+            <a:ext cx="4486901" cy="257211"/>
+          </a:xfrm>
+          <a:prstGeom prst="rect">
+            <a:avLst/>
+          </a:prstGeom>
+        </p:spPr>
+      </p:pic>
     </p:spTree>
     <p:extLst>
       <p:ext uri="{BB962C8B-B14F-4D97-AF65-F5344CB8AC3E}">
@@ -5539,11 +8571,239 @@
           <a:p>
             <a:r>
               <a:rPr lang="ko-KR" altLang="en-US" sz="2000" dirty="0"/>
-              <a:t>슬라이드 페이지 실습</a:t>
-            </a:r>
-          </a:p>
-        </p:txBody>
-      </p:sp>
+              <a:t>슬라이드 </a:t>
+            </a:r>
+            <a:r>
+              <a:rPr lang="en-US" altLang="ko-KR" sz="2000" dirty="0"/>
+              <a:t>23</a:t>
+            </a:r>
+            <a:r>
+              <a:rPr lang="ko-KR" altLang="en-US" sz="2000" dirty="0"/>
+              <a:t>페이지 실습 </a:t>
+            </a:r>
+            <a:r>
+              <a:rPr lang="en-US" altLang="ko-KR" sz="2000" dirty="0"/>
+              <a:t>(3), (4)</a:t>
+            </a:r>
+            <a:endParaRPr lang="ko-KR" altLang="en-US" sz="2000" dirty="0"/>
+          </a:p>
+        </p:txBody>
+      </p:sp>
+      <p:sp>
+        <p:nvSpPr>
+          <p:cNvPr id="5" name="TextBox 4">
+            <a:extLst>
+              <a:ext uri="{FF2B5EF4-FFF2-40B4-BE49-F238E27FC236}">
+                <a16:creationId xmlns:a16="http://schemas.microsoft.com/office/drawing/2014/main" id="{E4DB021D-E1BA-4932-56AA-B77B24C46CD4}"/>
+              </a:ext>
+            </a:extLst>
+          </p:cNvPr>
+          <p:cNvSpPr txBox="1"/>
+          <p:nvPr/>
+        </p:nvSpPr>
+        <p:spPr>
+          <a:xfrm>
+            <a:off x="8216537" y="1997839"/>
+            <a:ext cx="3975463" cy="3139321"/>
+          </a:xfrm>
+          <a:prstGeom prst="rect">
+            <a:avLst/>
+          </a:prstGeom>
+          <a:noFill/>
+        </p:spPr>
+        <p:txBody>
+          <a:bodyPr wrap="square" rtlCol="0">
+            <a:spAutoFit/>
+          </a:bodyPr>
+          <a:lstStyle/>
+          <a:p>
+            <a:pPr marL="342900" indent="-342900">
+              <a:buAutoNum type="arabicPeriod"/>
+            </a:pPr>
+            <a:r>
+              <a:rPr lang="ko-KR" altLang="en-US" dirty="0"/>
+              <a:t>복합 키를 지정하기위해 </a:t>
+            </a:r>
+            <a:r>
+              <a:rPr lang="en-US" altLang="ko-KR" dirty="0"/>
+              <a:t>id column </a:t>
+            </a:r>
+            <a:r>
+              <a:rPr lang="ko-KR" altLang="en-US" dirty="0"/>
+              <a:t>추가로 생성</a:t>
+            </a:r>
+            <a:r>
+              <a:rPr lang="en-US" altLang="ko-KR" dirty="0"/>
+              <a:t> </a:t>
+            </a:r>
+            <a:r>
+              <a:rPr lang="ko-KR" altLang="en-US" dirty="0"/>
+              <a:t>후 </a:t>
+            </a:r>
+            <a:r>
+              <a:rPr lang="en-US" altLang="ko-KR" dirty="0"/>
+              <a:t>id</a:t>
+            </a:r>
+            <a:r>
+              <a:rPr lang="ko-KR" altLang="en-US" dirty="0"/>
+              <a:t>와 데이터 기준일자를 복합 키로 지정하였음</a:t>
+            </a:r>
+            <a:r>
+              <a:rPr lang="en-US" altLang="ko-KR" dirty="0"/>
+              <a:t>.</a:t>
+            </a:r>
+          </a:p>
+          <a:p>
+            <a:pPr marL="342900" indent="-342900">
+              <a:buAutoNum type="arabicPeriod"/>
+            </a:pPr>
+            <a:endParaRPr lang="en-US" altLang="ko-KR" dirty="0"/>
+          </a:p>
+          <a:p>
+            <a:r>
+              <a:rPr lang="en-US" altLang="ko-KR" dirty="0"/>
+              <a:t>2. ’</a:t>
+            </a:r>
+            <a:r>
+              <a:rPr lang="ko-KR" altLang="en-US" dirty="0" err="1"/>
+              <a:t>설치년월</a:t>
+            </a:r>
+            <a:r>
+              <a:rPr lang="en-US" altLang="ko-KR" dirty="0"/>
+              <a:t>’</a:t>
+            </a:r>
+            <a:r>
+              <a:rPr lang="ko-KR" altLang="en-US" dirty="0"/>
+              <a:t>에 해당하는 </a:t>
+            </a:r>
+            <a:r>
+              <a:rPr lang="en-US" altLang="ko-KR" dirty="0"/>
+              <a:t>column  	</a:t>
+            </a:r>
+            <a:r>
+              <a:rPr lang="en-US" altLang="ko-KR" dirty="0" err="1"/>
+              <a:t>inst_date</a:t>
+            </a:r>
+            <a:r>
+              <a:rPr lang="ko-KR" altLang="en-US" dirty="0"/>
+              <a:t>의 데이터 형식을</a:t>
+            </a:r>
+            <a:endParaRPr lang="en-US" altLang="ko-KR" dirty="0"/>
+          </a:p>
+          <a:p>
+            <a:r>
+              <a:rPr lang="en-US" altLang="ko-KR" dirty="0"/>
+              <a:t>	Date</a:t>
+            </a:r>
+            <a:r>
+              <a:rPr lang="ko-KR" altLang="en-US" dirty="0"/>
+              <a:t>로 변경하였음</a:t>
+            </a:r>
+            <a:r>
+              <a:rPr lang="en-US" altLang="ko-KR" dirty="0"/>
+              <a:t>.</a:t>
+            </a:r>
+          </a:p>
+          <a:p>
+            <a:endParaRPr lang="ko-KR" altLang="en-US" dirty="0"/>
+          </a:p>
+          <a:p>
+            <a:r>
+              <a:rPr lang="en-US" altLang="ko-KR" dirty="0"/>
+              <a:t>3. </a:t>
+            </a:r>
+            <a:r>
+              <a:rPr lang="ko-KR" altLang="en-US" dirty="0"/>
+              <a:t>기존 </a:t>
+            </a:r>
+            <a:r>
+              <a:rPr lang="en-US" altLang="ko-KR" dirty="0"/>
+              <a:t>csv</a:t>
+            </a:r>
+            <a:r>
+              <a:rPr lang="ko-KR" altLang="en-US" dirty="0"/>
+              <a:t>파일의 </a:t>
+            </a:r>
+            <a:r>
+              <a:rPr lang="ko-KR" altLang="en-US" dirty="0" err="1"/>
+              <a:t>설치년월</a:t>
+            </a:r>
+            <a:r>
+              <a:rPr lang="ko-KR" altLang="en-US" dirty="0"/>
+              <a:t> </a:t>
+            </a:r>
+            <a:r>
+              <a:rPr lang="en-US" altLang="ko-KR" dirty="0"/>
+              <a:t>column</a:t>
+            </a:r>
+            <a:r>
+              <a:rPr lang="ko-KR" altLang="en-US" dirty="0"/>
+              <a:t>에 </a:t>
+            </a:r>
+            <a:r>
+              <a:rPr lang="en-US" altLang="ko-KR" dirty="0"/>
+              <a:t>	</a:t>
+            </a:r>
+            <a:r>
+              <a:rPr lang="ko-KR" altLang="en-US" dirty="0"/>
+              <a:t>있는 공백들은 </a:t>
+            </a:r>
+            <a:r>
+              <a:rPr lang="en-US" altLang="ko-KR" dirty="0"/>
+              <a:t>2015-12-15</a:t>
+            </a:r>
+            <a:r>
+              <a:rPr lang="ko-KR" altLang="en-US" dirty="0"/>
+              <a:t>로</a:t>
+            </a:r>
+            <a:r>
+              <a:rPr lang="en-US" altLang="ko-KR" dirty="0"/>
+              <a:t> </a:t>
+            </a:r>
+          </a:p>
+          <a:p>
+            <a:r>
+              <a:rPr lang="en-US" altLang="ko-KR" dirty="0"/>
+              <a:t>	</a:t>
+            </a:r>
+            <a:r>
+              <a:rPr lang="ko-KR" altLang="en-US" dirty="0"/>
+              <a:t>일괄 변경하였음</a:t>
+            </a:r>
+            <a:endParaRPr lang="en-US" altLang="ko-KR" dirty="0"/>
+          </a:p>
+        </p:txBody>
+      </p:sp>
+      <p:pic>
+        <p:nvPicPr>
+          <p:cNvPr id="9" name="그림 8">
+            <a:extLst>
+              <a:ext uri="{FF2B5EF4-FFF2-40B4-BE49-F238E27FC236}">
+                <a16:creationId xmlns:a16="http://schemas.microsoft.com/office/drawing/2014/main" id="{A190FA0B-1C0C-09EE-7638-F8CF09BF2DB6}"/>
+              </a:ext>
+            </a:extLst>
+          </p:cNvPr>
+          <p:cNvPicPr>
+            <a:picLocks noChangeAspect="1"/>
+          </p:cNvPicPr>
+          <p:nvPr/>
+        </p:nvPicPr>
+        <p:blipFill>
+          <a:blip r:embed="rId2"/>
+          <a:stretch>
+            <a:fillRect/>
+          </a:stretch>
+        </p:blipFill>
+        <p:spPr>
+          <a:xfrm>
+            <a:off x="0" y="1410326"/>
+            <a:ext cx="8066440" cy="4037348"/>
+          </a:xfrm>
+          <a:prstGeom prst="rect">
+            <a:avLst/>
+          </a:prstGeom>
+        </p:spPr>
+      </p:pic>
     </p:spTree>
     <p:extLst>
       <p:ext uri="{BB962C8B-B14F-4D97-AF65-F5344CB8AC3E}">

</xml_diff>